<commit_message>
update weekly report7 & java
</commit_message>
<xml_diff>
--- a/db/db.pptx
+++ b/db/db.pptx
@@ -5,10 +5,13 @@
     <p:sldMasterId id="2147483648" r:id="rId1"/>
   </p:sldMasterIdLst>
   <p:notesMasterIdLst>
-    <p:notesMasterId r:id="rId3"/>
+    <p:notesMasterId r:id="rId6"/>
   </p:notesMasterIdLst>
   <p:sldIdLst>
     <p:sldId id="291" r:id="rId2"/>
+    <p:sldId id="292" r:id="rId3"/>
+    <p:sldId id="294" r:id="rId4"/>
+    <p:sldId id="293" r:id="rId5"/>
   </p:sldIdLst>
   <p:sldSz cx="12192000" cy="6858000"/>
   <p:notesSz cx="6858000" cy="9144000"/>
@@ -197,7 +200,7 @@
           <a:p>
             <a:fld id="{D6325AFB-0FBC-4F05-BBB8-413515365240}" type="datetimeFigureOut">
               <a:rPr lang="ko-KR" altLang="en-US" smtClean="0"/>
-              <a:t>2020-04-16</a:t>
+              <a:t>2020-05-01</a:t>
             </a:fld>
             <a:endParaRPr lang="ko-KR" altLang="en-US"/>
           </a:p>
@@ -548,6 +551,174 @@
 </p:notes>
 </file>
 
+<file path=ppt/notesSlides/notesSlide2.xml><?xml version="1.0" encoding="utf-8"?>
+<p:notes xmlns:a="http://schemas.openxmlformats.org/drawingml/2006/main" xmlns:r="http://schemas.openxmlformats.org/officeDocument/2006/relationships" xmlns:p="http://schemas.openxmlformats.org/presentationml/2006/main">
+  <p:cSld>
+    <p:spTree>
+      <p:nvGrpSpPr>
+        <p:cNvPr id="1" name=""/>
+        <p:cNvGrpSpPr/>
+        <p:nvPr/>
+      </p:nvGrpSpPr>
+      <p:grpSpPr>
+        <a:xfrm>
+          <a:off x="0" y="0"/>
+          <a:ext cx="0" cy="0"/>
+          <a:chOff x="0" y="0"/>
+          <a:chExt cx="0" cy="0"/>
+        </a:xfrm>
+      </p:grpSpPr>
+      <p:sp>
+        <p:nvSpPr>
+          <p:cNvPr id="2" name="슬라이드 이미지 개체 틀 1"/>
+          <p:cNvSpPr>
+            <a:spLocks noGrp="1" noRot="1" noChangeAspect="1"/>
+          </p:cNvSpPr>
+          <p:nvPr>
+            <p:ph type="sldImg"/>
+          </p:nvPr>
+        </p:nvSpPr>
+        <p:spPr/>
+      </p:sp>
+      <p:sp>
+        <p:nvSpPr>
+          <p:cNvPr id="3" name="슬라이드 노트 개체 틀 2"/>
+          <p:cNvSpPr>
+            <a:spLocks noGrp="1"/>
+          </p:cNvSpPr>
+          <p:nvPr>
+            <p:ph type="body" idx="1"/>
+          </p:nvPr>
+        </p:nvSpPr>
+        <p:spPr/>
+        <p:txBody>
+          <a:bodyPr/>
+          <a:lstStyle/>
+          <a:p>
+            <a:endParaRPr lang="ko-KR" altLang="en-US" dirty="0"/>
+          </a:p>
+        </p:txBody>
+      </p:sp>
+      <p:sp>
+        <p:nvSpPr>
+          <p:cNvPr id="4" name="슬라이드 번호 개체 틀 3"/>
+          <p:cNvSpPr>
+            <a:spLocks noGrp="1"/>
+          </p:cNvSpPr>
+          <p:nvPr>
+            <p:ph type="sldNum" sz="quarter" idx="5"/>
+          </p:nvPr>
+        </p:nvSpPr>
+        <p:spPr/>
+        <p:txBody>
+          <a:bodyPr/>
+          <a:lstStyle/>
+          <a:p>
+            <a:fld id="{F768C30D-220E-475F-84FC-3F719E92BE76}" type="slidenum">
+              <a:rPr lang="ko-KR" altLang="en-US" smtClean="0"/>
+              <a:t>2</a:t>
+            </a:fld>
+            <a:endParaRPr lang="ko-KR" altLang="en-US"/>
+          </a:p>
+        </p:txBody>
+      </p:sp>
+    </p:spTree>
+    <p:extLst>
+      <p:ext uri="{BB962C8B-B14F-4D97-AF65-F5344CB8AC3E}">
+        <p14:creationId xmlns:p14="http://schemas.microsoft.com/office/powerpoint/2010/main" val="2333749236"/>
+      </p:ext>
+    </p:extLst>
+  </p:cSld>
+  <p:clrMapOvr>
+    <a:masterClrMapping/>
+  </p:clrMapOvr>
+</p:notes>
+</file>
+
+<file path=ppt/notesSlides/notesSlide3.xml><?xml version="1.0" encoding="utf-8"?>
+<p:notes xmlns:a="http://schemas.openxmlformats.org/drawingml/2006/main" xmlns:r="http://schemas.openxmlformats.org/officeDocument/2006/relationships" xmlns:p="http://schemas.openxmlformats.org/presentationml/2006/main">
+  <p:cSld>
+    <p:spTree>
+      <p:nvGrpSpPr>
+        <p:cNvPr id="1" name=""/>
+        <p:cNvGrpSpPr/>
+        <p:nvPr/>
+      </p:nvGrpSpPr>
+      <p:grpSpPr>
+        <a:xfrm>
+          <a:off x="0" y="0"/>
+          <a:ext cx="0" cy="0"/>
+          <a:chOff x="0" y="0"/>
+          <a:chExt cx="0" cy="0"/>
+        </a:xfrm>
+      </p:grpSpPr>
+      <p:sp>
+        <p:nvSpPr>
+          <p:cNvPr id="2" name="슬라이드 이미지 개체 틀 1"/>
+          <p:cNvSpPr>
+            <a:spLocks noGrp="1" noRot="1" noChangeAspect="1"/>
+          </p:cNvSpPr>
+          <p:nvPr>
+            <p:ph type="sldImg"/>
+          </p:nvPr>
+        </p:nvSpPr>
+        <p:spPr/>
+      </p:sp>
+      <p:sp>
+        <p:nvSpPr>
+          <p:cNvPr id="3" name="슬라이드 노트 개체 틀 2"/>
+          <p:cNvSpPr>
+            <a:spLocks noGrp="1"/>
+          </p:cNvSpPr>
+          <p:nvPr>
+            <p:ph type="body" idx="1"/>
+          </p:nvPr>
+        </p:nvSpPr>
+        <p:spPr/>
+        <p:txBody>
+          <a:bodyPr/>
+          <a:lstStyle/>
+          <a:p>
+            <a:endParaRPr lang="ko-KR" altLang="en-US" dirty="0"/>
+          </a:p>
+        </p:txBody>
+      </p:sp>
+      <p:sp>
+        <p:nvSpPr>
+          <p:cNvPr id="4" name="슬라이드 번호 개체 틀 3"/>
+          <p:cNvSpPr>
+            <a:spLocks noGrp="1"/>
+          </p:cNvSpPr>
+          <p:nvPr>
+            <p:ph type="sldNum" sz="quarter" idx="5"/>
+          </p:nvPr>
+        </p:nvSpPr>
+        <p:spPr/>
+        <p:txBody>
+          <a:bodyPr/>
+          <a:lstStyle/>
+          <a:p>
+            <a:fld id="{F768C30D-220E-475F-84FC-3F719E92BE76}" type="slidenum">
+              <a:rPr lang="ko-KR" altLang="en-US" smtClean="0"/>
+              <a:t>3</a:t>
+            </a:fld>
+            <a:endParaRPr lang="ko-KR" altLang="en-US"/>
+          </a:p>
+        </p:txBody>
+      </p:sp>
+    </p:spTree>
+    <p:extLst>
+      <p:ext uri="{BB962C8B-B14F-4D97-AF65-F5344CB8AC3E}">
+        <p14:creationId xmlns:p14="http://schemas.microsoft.com/office/powerpoint/2010/main" val="3640473466"/>
+      </p:ext>
+    </p:extLst>
+  </p:cSld>
+  <p:clrMapOvr>
+    <a:masterClrMapping/>
+  </p:clrMapOvr>
+</p:notes>
+</file>
+
 <file path=ppt/slideLayouts/slideLayout1.xml><?xml version="1.0" encoding="utf-8"?>
 <p:sldLayout xmlns:a="http://schemas.openxmlformats.org/drawingml/2006/main" xmlns:r="http://schemas.openxmlformats.org/officeDocument/2006/relationships" xmlns:p="http://schemas.openxmlformats.org/presentationml/2006/main" type="title" preserve="1">
   <p:cSld name="제목 슬라이드">
@@ -695,7 +866,7 @@
           <a:p>
             <a:fld id="{4980B581-256F-468E-AE28-AA7509665FD7}" type="datetimeFigureOut">
               <a:rPr lang="ko-KR" altLang="en-US" smtClean="0"/>
-              <a:t>2020-04-16</a:t>
+              <a:t>2020-05-01</a:t>
             </a:fld>
             <a:endParaRPr lang="ko-KR" altLang="en-US"/>
           </a:p>
@@ -893,7 +1064,7 @@
           <a:p>
             <a:fld id="{4980B581-256F-468E-AE28-AA7509665FD7}" type="datetimeFigureOut">
               <a:rPr lang="ko-KR" altLang="en-US" smtClean="0"/>
-              <a:t>2020-04-16</a:t>
+              <a:t>2020-05-01</a:t>
             </a:fld>
             <a:endParaRPr lang="ko-KR" altLang="en-US"/>
           </a:p>
@@ -1101,7 +1272,7 @@
           <a:p>
             <a:fld id="{4980B581-256F-468E-AE28-AA7509665FD7}" type="datetimeFigureOut">
               <a:rPr lang="ko-KR" altLang="en-US" smtClean="0"/>
-              <a:t>2020-04-16</a:t>
+              <a:t>2020-05-01</a:t>
             </a:fld>
             <a:endParaRPr lang="ko-KR" altLang="en-US"/>
           </a:p>
@@ -1299,7 +1470,7 @@
           <a:p>
             <a:fld id="{4980B581-256F-468E-AE28-AA7509665FD7}" type="datetimeFigureOut">
               <a:rPr lang="ko-KR" altLang="en-US" smtClean="0"/>
-              <a:t>2020-04-16</a:t>
+              <a:t>2020-05-01</a:t>
             </a:fld>
             <a:endParaRPr lang="ko-KR" altLang="en-US"/>
           </a:p>
@@ -1574,7 +1745,7 @@
           <a:p>
             <a:fld id="{4980B581-256F-468E-AE28-AA7509665FD7}" type="datetimeFigureOut">
               <a:rPr lang="ko-KR" altLang="en-US" smtClean="0"/>
-              <a:t>2020-04-16</a:t>
+              <a:t>2020-05-01</a:t>
             </a:fld>
             <a:endParaRPr lang="ko-KR" altLang="en-US"/>
           </a:p>
@@ -1839,7 +2010,7 @@
           <a:p>
             <a:fld id="{4980B581-256F-468E-AE28-AA7509665FD7}" type="datetimeFigureOut">
               <a:rPr lang="ko-KR" altLang="en-US" smtClean="0"/>
-              <a:t>2020-04-16</a:t>
+              <a:t>2020-05-01</a:t>
             </a:fld>
             <a:endParaRPr lang="ko-KR" altLang="en-US"/>
           </a:p>
@@ -2251,7 +2422,7 @@
           <a:p>
             <a:fld id="{4980B581-256F-468E-AE28-AA7509665FD7}" type="datetimeFigureOut">
               <a:rPr lang="ko-KR" altLang="en-US" smtClean="0"/>
-              <a:t>2020-04-16</a:t>
+              <a:t>2020-05-01</a:t>
             </a:fld>
             <a:endParaRPr lang="ko-KR" altLang="en-US"/>
           </a:p>
@@ -2392,7 +2563,7 @@
           <a:p>
             <a:fld id="{4980B581-256F-468E-AE28-AA7509665FD7}" type="datetimeFigureOut">
               <a:rPr lang="ko-KR" altLang="en-US" smtClean="0"/>
-              <a:t>2020-04-16</a:t>
+              <a:t>2020-05-01</a:t>
             </a:fld>
             <a:endParaRPr lang="ko-KR" altLang="en-US"/>
           </a:p>
@@ -2505,7 +2676,7 @@
           <a:p>
             <a:fld id="{4980B581-256F-468E-AE28-AA7509665FD7}" type="datetimeFigureOut">
               <a:rPr lang="ko-KR" altLang="en-US" smtClean="0"/>
-              <a:t>2020-04-16</a:t>
+              <a:t>2020-05-01</a:t>
             </a:fld>
             <a:endParaRPr lang="ko-KR" altLang="en-US"/>
           </a:p>
@@ -2816,7 +2987,7 @@
           <a:p>
             <a:fld id="{4980B581-256F-468E-AE28-AA7509665FD7}" type="datetimeFigureOut">
               <a:rPr lang="ko-KR" altLang="en-US" smtClean="0"/>
-              <a:t>2020-04-16</a:t>
+              <a:t>2020-05-01</a:t>
             </a:fld>
             <a:endParaRPr lang="ko-KR" altLang="en-US"/>
           </a:p>
@@ -3104,7 +3275,7 @@
           <a:p>
             <a:fld id="{4980B581-256F-468E-AE28-AA7509665FD7}" type="datetimeFigureOut">
               <a:rPr lang="ko-KR" altLang="en-US" smtClean="0"/>
-              <a:t>2020-04-16</a:t>
+              <a:t>2020-05-01</a:t>
             </a:fld>
             <a:endParaRPr lang="ko-KR" altLang="en-US"/>
           </a:p>
@@ -3345,7 +3516,7 @@
           <a:p>
             <a:fld id="{4980B581-256F-468E-AE28-AA7509665FD7}" type="datetimeFigureOut">
               <a:rPr lang="ko-KR" altLang="en-US" smtClean="0"/>
-              <a:t>2020-04-16</a:t>
+              <a:t>2020-05-01</a:t>
             </a:fld>
             <a:endParaRPr lang="ko-KR" altLang="en-US"/>
           </a:p>
@@ -3778,7 +3949,7 @@
             <p:ph idx="1"/>
             <p:extLst>
               <p:ext uri="{D42A27DB-BD31-4B8C-83A1-F6EECF244321}">
-                <p14:modId xmlns:p14="http://schemas.microsoft.com/office/powerpoint/2010/main" val="1558529474"/>
+                <p14:modId xmlns:p14="http://schemas.microsoft.com/office/powerpoint/2010/main" val="1877521164"/>
               </p:ext>
             </p:extLst>
           </p:nvPr>
@@ -4135,24 +4306,24 @@
                         <a:t>라즈베리파이 </a:t>
                       </a:r>
                       <a:r>
-                        <a:rPr lang="en-US" altLang="ko-KR" u="sng" dirty="0"/>
+                        <a:rPr lang="en-US" altLang="ko-KR" u="sng"/>
                         <a:t>ID</a:t>
                       </a:r>
                       <a:r>
-                        <a:rPr lang="en-US" altLang="ko-KR" dirty="0"/>
-                        <a:t>, </a:t>
-                      </a:r>
-                      <a:r>
-                        <a:rPr lang="ko-KR" altLang="en-US" dirty="0"/>
-                        <a:t>냉장고 이름</a:t>
-                      </a:r>
-                      <a:r>
-                        <a:rPr lang="en-US" altLang="ko-KR" dirty="0"/>
+                        <a:rPr lang="en-US" altLang="ko-KR"/>
                         <a:t>, </a:t>
                       </a:r>
                       <a:r>
                         <a:rPr lang="ko-KR" altLang="en-US" dirty="0"/>
                         <a:t>비밀번호</a:t>
+                      </a:r>
+                      <a:r>
+                        <a:rPr lang="en-US" altLang="ko-KR" dirty="0"/>
+                        <a:t>,</a:t>
+                      </a:r>
+                      <a:r>
+                        <a:rPr lang="ko-KR" altLang="en-US" dirty="0"/>
+                        <a:t> 냉장고 이름</a:t>
                       </a:r>
                       <a:r>
                         <a:rPr lang="en-US" altLang="ko-KR" dirty="0"/>
@@ -5420,6 +5591,2146 @@
     <p:extLst>
       <p:ext uri="{BB962C8B-B14F-4D97-AF65-F5344CB8AC3E}">
         <p14:creationId xmlns:p14="http://schemas.microsoft.com/office/powerpoint/2010/main" val="2027455167"/>
+      </p:ext>
+    </p:extLst>
+  </p:cSld>
+  <p:clrMapOvr>
+    <a:masterClrMapping/>
+  </p:clrMapOvr>
+</p:sld>
+</file>
+
+<file path=ppt/slides/slide2.xml><?xml version="1.0" encoding="utf-8"?>
+<p:sld xmlns:a="http://schemas.openxmlformats.org/drawingml/2006/main" xmlns:r="http://schemas.openxmlformats.org/officeDocument/2006/relationships" xmlns:p="http://schemas.openxmlformats.org/presentationml/2006/main">
+  <p:cSld>
+    <p:spTree>
+      <p:nvGrpSpPr>
+        <p:cNvPr id="1" name=""/>
+        <p:cNvGrpSpPr/>
+        <p:nvPr/>
+      </p:nvGrpSpPr>
+      <p:grpSpPr>
+        <a:xfrm>
+          <a:off x="0" y="0"/>
+          <a:ext cx="0" cy="0"/>
+          <a:chOff x="0" y="0"/>
+          <a:chExt cx="0" cy="0"/>
+        </a:xfrm>
+      </p:grpSpPr>
+      <p:graphicFrame>
+        <p:nvGraphicFramePr>
+          <p:cNvPr id="8" name="표 8">
+            <a:extLst>
+              <a:ext uri="{FF2B5EF4-FFF2-40B4-BE49-F238E27FC236}">
+                <a16:creationId xmlns:a16="http://schemas.microsoft.com/office/drawing/2014/main" id="{B568D9AB-B22F-48CD-8B22-97456B249EF4}"/>
+              </a:ext>
+            </a:extLst>
+          </p:cNvPr>
+          <p:cNvGraphicFramePr>
+            <a:graphicFrameLocks noGrp="1"/>
+          </p:cNvGraphicFramePr>
+          <p:nvPr>
+            <p:ph idx="1"/>
+            <p:extLst>
+              <p:ext uri="{D42A27DB-BD31-4B8C-83A1-F6EECF244321}">
+                <p14:modId xmlns:p14="http://schemas.microsoft.com/office/powerpoint/2010/main" val="2958301025"/>
+              </p:ext>
+            </p:extLst>
+          </p:nvPr>
+        </p:nvGraphicFramePr>
+        <p:xfrm>
+          <a:off x="761637" y="323644"/>
+          <a:ext cx="10995494" cy="5831840"/>
+        </p:xfrm>
+        <a:graphic>
+          <a:graphicData uri="http://schemas.openxmlformats.org/drawingml/2006/table">
+            <a:tbl>
+              <a:tblPr firstRow="1" bandRow="1">
+                <a:tableStyleId>{7DF18680-E054-41AD-8BC1-D1AEF772440D}</a:tableStyleId>
+              </a:tblPr>
+              <a:tblGrid>
+                <a:gridCol w="10995494">
+                  <a:extLst>
+                    <a:ext uri="{9D8B030D-6E8A-4147-A177-3AD203B41FA5}">
+                      <a16:colId xmlns:a16="http://schemas.microsoft.com/office/drawing/2014/main" val="222062879"/>
+                    </a:ext>
+                  </a:extLst>
+                </a:gridCol>
+              </a:tblGrid>
+              <a:tr h="280115">
+                <a:tc>
+                  <a:txBody>
+                    <a:bodyPr/>
+                    <a:lstStyle/>
+                    <a:p>
+                      <a:pPr latinLnBrk="1"/>
+                      <a:r>
+                        <a:rPr lang="ko-KR" altLang="en-US" b="0" dirty="0">
+                          <a:solidFill>
+                            <a:schemeClr val="tx1"/>
+                          </a:solidFill>
+                        </a:rPr>
+                        <a:t>회원</a:t>
+                      </a:r>
+                      <a:r>
+                        <a:rPr lang="en-US" altLang="ko-KR" b="0" dirty="0">
+                          <a:solidFill>
+                            <a:schemeClr val="tx1"/>
+                          </a:solidFill>
+                        </a:rPr>
+                        <a:t>(</a:t>
+                      </a:r>
+                      <a:r>
+                        <a:rPr lang="en-US" altLang="ko-KR" b="0" u="sng" dirty="0">
+                          <a:solidFill>
+                            <a:schemeClr val="tx1"/>
+                          </a:solidFill>
+                        </a:rPr>
+                        <a:t>E-mail</a:t>
+                      </a:r>
+                      <a:r>
+                        <a:rPr lang="en-US" altLang="ko-KR" b="0" dirty="0">
+                          <a:solidFill>
+                            <a:schemeClr val="tx1"/>
+                          </a:solidFill>
+                        </a:rPr>
+                        <a:t>, PW, </a:t>
+                      </a:r>
+                      <a:r>
+                        <a:rPr lang="ko-KR" altLang="en-US" b="0" dirty="0">
+                          <a:solidFill>
+                            <a:schemeClr val="tx1"/>
+                          </a:solidFill>
+                        </a:rPr>
+                        <a:t>생년월일</a:t>
+                      </a:r>
+                      <a:r>
+                        <a:rPr lang="en-US" altLang="ko-KR" b="0" dirty="0">
+                          <a:solidFill>
+                            <a:schemeClr val="tx1"/>
+                          </a:solidFill>
+                        </a:rPr>
+                        <a:t>, </a:t>
+                      </a:r>
+                      <a:r>
+                        <a:rPr lang="ko-KR" altLang="en-US" b="0" dirty="0">
+                          <a:solidFill>
+                            <a:schemeClr val="tx1"/>
+                          </a:solidFill>
+                        </a:rPr>
+                        <a:t>성별</a:t>
+                      </a:r>
+                      <a:r>
+                        <a:rPr lang="en-US" altLang="ko-KR" b="0" dirty="0">
+                          <a:solidFill>
+                            <a:schemeClr val="tx1"/>
+                          </a:solidFill>
+                        </a:rPr>
+                        <a:t>,</a:t>
+                      </a:r>
+                      <a:r>
+                        <a:rPr lang="ko-KR" altLang="en-US" dirty="0"/>
+                        <a:t> </a:t>
+                      </a:r>
+                      <a:r>
+                        <a:rPr lang="ko-KR" altLang="en-US" b="0" dirty="0">
+                          <a:solidFill>
+                            <a:schemeClr val="tx1"/>
+                          </a:solidFill>
+                        </a:rPr>
+                        <a:t>유통기한 초과 알림</a:t>
+                      </a:r>
+                      <a:r>
+                        <a:rPr lang="en-US" altLang="ko-KR" b="0" dirty="0">
+                          <a:solidFill>
+                            <a:schemeClr val="tx1"/>
+                          </a:solidFill>
+                        </a:rPr>
+                        <a:t>,</a:t>
+                      </a:r>
+                      <a:r>
+                        <a:rPr lang="ko-KR" altLang="en-US" b="0" dirty="0">
+                          <a:solidFill>
+                            <a:schemeClr val="tx1"/>
+                          </a:solidFill>
+                        </a:rPr>
+                        <a:t> 유통기한 임박 알림</a:t>
+                      </a:r>
+                      <a:r>
+                        <a:rPr lang="en-US" altLang="ko-KR" b="0" dirty="0">
+                          <a:solidFill>
+                            <a:schemeClr val="tx1"/>
+                          </a:solidFill>
+                        </a:rPr>
+                        <a:t>, </a:t>
+                      </a:r>
+                      <a:r>
+                        <a:rPr lang="ko-KR" altLang="en-US" b="0" dirty="0">
+                          <a:solidFill>
+                            <a:schemeClr val="tx1"/>
+                          </a:solidFill>
+                        </a:rPr>
+                        <a:t>식사시간</a:t>
+                      </a:r>
+                      <a:r>
+                        <a:rPr lang="en-US" altLang="ko-KR" b="0" dirty="0">
+                          <a:solidFill>
+                            <a:schemeClr val="tx1"/>
+                          </a:solidFill>
+                        </a:rPr>
+                        <a:t>(5</a:t>
+                      </a:r>
+                      <a:r>
+                        <a:rPr lang="ko-KR" altLang="en-US" b="0" dirty="0">
+                          <a:solidFill>
+                            <a:schemeClr val="tx1"/>
+                          </a:solidFill>
+                        </a:rPr>
+                        <a:t>개</a:t>
+                      </a:r>
+                      <a:r>
+                        <a:rPr lang="en-US" altLang="ko-KR" b="0" dirty="0">
+                          <a:solidFill>
+                            <a:schemeClr val="tx1"/>
+                          </a:solidFill>
+                        </a:rPr>
+                        <a:t>), </a:t>
+                      </a:r>
+                      <a:r>
+                        <a:rPr lang="ko-KR" altLang="en-US" b="0" dirty="0">
+                          <a:solidFill>
+                            <a:schemeClr val="tx1"/>
+                          </a:solidFill>
+                        </a:rPr>
+                        <a:t>레시피 난이도 쉬움</a:t>
+                      </a:r>
+                      <a:r>
+                        <a:rPr lang="en-US" altLang="ko-KR" b="0" dirty="0">
+                          <a:solidFill>
+                            <a:schemeClr val="tx1"/>
+                          </a:solidFill>
+                        </a:rPr>
+                        <a:t>, </a:t>
+                      </a:r>
+                      <a:r>
+                        <a:rPr lang="ko-KR" altLang="en-US" b="0" dirty="0">
+                          <a:solidFill>
+                            <a:schemeClr val="tx1"/>
+                          </a:solidFill>
+                        </a:rPr>
+                        <a:t>보통</a:t>
+                      </a:r>
+                      <a:r>
+                        <a:rPr lang="en-US" altLang="ko-KR" b="0" dirty="0">
+                          <a:solidFill>
+                            <a:schemeClr val="tx1"/>
+                          </a:solidFill>
+                        </a:rPr>
+                        <a:t>, </a:t>
+                      </a:r>
+                      <a:r>
+                        <a:rPr lang="ko-KR" altLang="en-US" b="0" dirty="0">
+                          <a:solidFill>
+                            <a:schemeClr val="tx1"/>
+                          </a:solidFill>
+                        </a:rPr>
+                        <a:t>어려움</a:t>
+                      </a:r>
+                      <a:r>
+                        <a:rPr lang="en-US" altLang="ko-KR" b="0" dirty="0">
+                          <a:solidFill>
+                            <a:schemeClr val="tx1"/>
+                          </a:solidFill>
+                        </a:rPr>
+                        <a:t>, </a:t>
+                      </a:r>
+                      <a:r>
+                        <a:rPr lang="ko-KR" altLang="en-US" b="0" dirty="0">
+                          <a:solidFill>
+                            <a:schemeClr val="tx1"/>
+                          </a:solidFill>
+                        </a:rPr>
+                        <a:t>조리 시간</a:t>
+                      </a:r>
+                      <a:r>
+                        <a:rPr lang="en-US" altLang="ko-KR" b="0" dirty="0">
+                          <a:solidFill>
+                            <a:schemeClr val="tx1"/>
+                          </a:solidFill>
+                        </a:rPr>
+                        <a:t>)</a:t>
+                      </a:r>
+                      <a:endParaRPr lang="ko-KR" altLang="en-US" b="0" dirty="0">
+                        <a:solidFill>
+                          <a:schemeClr val="tx1"/>
+                        </a:solidFill>
+                      </a:endParaRPr>
+                    </a:p>
+                  </a:txBody>
+                  <a:tcPr>
+                    <a:lnL w="12700" cmpd="sng">
+                      <a:noFill/>
+                    </a:lnL>
+                    <a:lnR w="12700" cmpd="sng">
+                      <a:noFill/>
+                    </a:lnR>
+                    <a:lnT w="38100" cmpd="sng">
+                      <a:noFill/>
+                    </a:lnT>
+                    <a:lnB w="38100" cmpd="sng">
+                      <a:noFill/>
+                    </a:lnB>
+                    <a:lnTlToBr w="12700" cmpd="sng">
+                      <a:noFill/>
+                      <a:prstDash val="solid"/>
+                    </a:lnTlToBr>
+                    <a:lnBlToTr w="12700" cmpd="sng">
+                      <a:noFill/>
+                      <a:prstDash val="solid"/>
+                    </a:lnBlToTr>
+                    <a:solidFill>
+                      <a:srgbClr val="EAEFF7"/>
+                    </a:solidFill>
+                  </a:tcPr>
+                </a:tc>
+                <a:extLst>
+                  <a:ext uri="{0D108BD9-81ED-4DB2-BD59-A6C34878D82A}">
+                    <a16:rowId xmlns:a16="http://schemas.microsoft.com/office/drawing/2014/main" val="2187153716"/>
+                  </a:ext>
+                </a:extLst>
+              </a:tr>
+              <a:tr h="370840">
+                <a:tc>
+                  <a:txBody>
+                    <a:bodyPr/>
+                    <a:lstStyle/>
+                    <a:p>
+                      <a:pPr latinLnBrk="1"/>
+                      <a:r>
+                        <a:rPr lang="ko-KR" altLang="en-US" dirty="0"/>
+                        <a:t>소유</a:t>
+                      </a:r>
+                      <a:r>
+                        <a:rPr lang="en-US" altLang="ko-KR" dirty="0"/>
+                        <a:t>(</a:t>
+                      </a:r>
+                      <a:r>
+                        <a:rPr lang="en-US" altLang="ko-KR" b="0" u="sng" dirty="0">
+                          <a:solidFill>
+                            <a:schemeClr val="tx1"/>
+                          </a:solidFill>
+                        </a:rPr>
+                        <a:t>E-mail</a:t>
+                      </a:r>
+                      <a:r>
+                        <a:rPr lang="en-US" altLang="ko-KR" u="sng" dirty="0"/>
+                        <a:t>, </a:t>
+                      </a:r>
+                      <a:r>
+                        <a:rPr lang="ko-KR" altLang="en-US" u="sng" dirty="0"/>
+                        <a:t>라즈베리파이 </a:t>
+                      </a:r>
+                      <a:r>
+                        <a:rPr lang="en-US" altLang="ko-KR" u="sng" dirty="0"/>
+                        <a:t>ID</a:t>
+                      </a:r>
+                      <a:r>
+                        <a:rPr lang="en-US" altLang="ko-KR" dirty="0"/>
+                        <a:t>)</a:t>
+                      </a:r>
+                      <a:endParaRPr lang="ko-KR" altLang="en-US" dirty="0"/>
+                    </a:p>
+                  </a:txBody>
+                  <a:tcPr>
+                    <a:lnL w="12700" cmpd="sng">
+                      <a:noFill/>
+                    </a:lnL>
+                    <a:lnR w="12700" cmpd="sng">
+                      <a:noFill/>
+                    </a:lnR>
+                    <a:lnT w="38100" cmpd="sng">
+                      <a:noFill/>
+                    </a:lnT>
+                    <a:lnB w="12700" cmpd="sng">
+                      <a:noFill/>
+                    </a:lnB>
+                    <a:lnTlToBr w="12700" cmpd="sng">
+                      <a:noFill/>
+                      <a:prstDash val="solid"/>
+                    </a:lnTlToBr>
+                    <a:lnBlToTr w="12700" cmpd="sng">
+                      <a:noFill/>
+                      <a:prstDash val="solid"/>
+                    </a:lnBlToTr>
+                  </a:tcPr>
+                </a:tc>
+                <a:extLst>
+                  <a:ext uri="{0D108BD9-81ED-4DB2-BD59-A6C34878D82A}">
+                    <a16:rowId xmlns:a16="http://schemas.microsoft.com/office/drawing/2014/main" val="4070729719"/>
+                  </a:ext>
+                </a:extLst>
+              </a:tr>
+              <a:tr h="370840">
+                <a:tc>
+                  <a:txBody>
+                    <a:bodyPr/>
+                    <a:lstStyle/>
+                    <a:p>
+                      <a:pPr latinLnBrk="1"/>
+                      <a:r>
+                        <a:rPr lang="ko-KR" altLang="en-US" dirty="0"/>
+                        <a:t>냉장고</a:t>
+                      </a:r>
+                      <a:r>
+                        <a:rPr lang="en-US" altLang="ko-KR" dirty="0"/>
+                        <a:t>(</a:t>
+                      </a:r>
+                      <a:r>
+                        <a:rPr lang="ko-KR" altLang="en-US" u="sng" dirty="0"/>
+                        <a:t>라즈베리파이 </a:t>
+                      </a:r>
+                      <a:r>
+                        <a:rPr lang="en-US" altLang="ko-KR" u="sng"/>
+                        <a:t>ID</a:t>
+                      </a:r>
+                      <a:r>
+                        <a:rPr lang="en-US" altLang="ko-KR"/>
+                        <a:t>, </a:t>
+                      </a:r>
+                      <a:r>
+                        <a:rPr lang="ko-KR" altLang="en-US" dirty="0"/>
+                        <a:t>비밀번호</a:t>
+                      </a:r>
+                      <a:r>
+                        <a:rPr lang="en-US" altLang="ko-KR" dirty="0"/>
+                        <a:t>,</a:t>
+                      </a:r>
+                      <a:r>
+                        <a:rPr lang="ko-KR" altLang="en-US" dirty="0"/>
+                        <a:t> 냉장고 이름</a:t>
+                      </a:r>
+                      <a:r>
+                        <a:rPr lang="en-US" altLang="ko-KR" dirty="0"/>
+                        <a:t>, </a:t>
+                      </a:r>
+                      <a:r>
+                        <a:rPr lang="ko-KR" altLang="en-US" dirty="0"/>
+                        <a:t>설치 장소</a:t>
+                      </a:r>
+                      <a:r>
+                        <a:rPr lang="en-US" altLang="ko-KR" dirty="0"/>
+                        <a:t>)</a:t>
+                      </a:r>
+                      <a:endParaRPr lang="ko-KR" altLang="en-US" dirty="0"/>
+                    </a:p>
+                  </a:txBody>
+                  <a:tcPr>
+                    <a:lnL w="12700" cmpd="sng">
+                      <a:noFill/>
+                    </a:lnL>
+                    <a:lnR w="12700" cmpd="sng">
+                      <a:noFill/>
+                    </a:lnR>
+                    <a:lnT w="38100" cmpd="sng">
+                      <a:noFill/>
+                    </a:lnT>
+                    <a:lnB w="12700" cmpd="sng">
+                      <a:noFill/>
+                    </a:lnB>
+                    <a:lnTlToBr w="12700" cmpd="sng">
+                      <a:noFill/>
+                      <a:prstDash val="solid"/>
+                    </a:lnTlToBr>
+                    <a:lnBlToTr w="12700" cmpd="sng">
+                      <a:noFill/>
+                      <a:prstDash val="solid"/>
+                    </a:lnBlToTr>
+                  </a:tcPr>
+                </a:tc>
+                <a:extLst>
+                  <a:ext uri="{0D108BD9-81ED-4DB2-BD59-A6C34878D82A}">
+                    <a16:rowId xmlns:a16="http://schemas.microsoft.com/office/drawing/2014/main" val="4187486808"/>
+                  </a:ext>
+                </a:extLst>
+              </a:tr>
+              <a:tr h="370840">
+                <a:tc>
+                  <a:txBody>
+                    <a:bodyPr/>
+                    <a:lstStyle/>
+                    <a:p>
+                      <a:pPr marL="0" marR="0" lvl="0" indent="0" algn="l" defTabSz="914400" rtl="0" eaLnBrk="1" fontAlgn="auto" latinLnBrk="1" hangingPunct="1">
+                        <a:lnSpc>
+                          <a:spcPct val="100000"/>
+                        </a:lnSpc>
+                        <a:spcBef>
+                          <a:spcPts val="0"/>
+                        </a:spcBef>
+                        <a:spcAft>
+                          <a:spcPts val="0"/>
+                        </a:spcAft>
+                        <a:buClrTx/>
+                        <a:buSzTx/>
+                        <a:buFontTx/>
+                        <a:buNone/>
+                        <a:tabLst/>
+                        <a:defRPr/>
+                      </a:pPr>
+                      <a:r>
+                        <a:rPr lang="ko-KR" altLang="en-US" dirty="0"/>
+                        <a:t>카메라</a:t>
+                      </a:r>
+                      <a:r>
+                        <a:rPr lang="en-US" altLang="ko-KR" dirty="0"/>
+                        <a:t>(</a:t>
+                      </a:r>
+                      <a:r>
+                        <a:rPr lang="ko-KR" altLang="en-US" u="sng" dirty="0"/>
+                        <a:t>카메라 </a:t>
+                      </a:r>
+                      <a:r>
+                        <a:rPr lang="en-US" altLang="ko-KR" u="sng" dirty="0"/>
+                        <a:t>ID</a:t>
+                      </a:r>
+                      <a:r>
+                        <a:rPr lang="en-US" altLang="ko-KR" dirty="0"/>
+                        <a:t>, </a:t>
+                      </a:r>
+                      <a:r>
+                        <a:rPr lang="ko-KR" altLang="en-US" dirty="0"/>
+                        <a:t>라즈베리파이 </a:t>
+                      </a:r>
+                      <a:r>
+                        <a:rPr lang="en-US" altLang="ko-KR" dirty="0"/>
+                        <a:t>ID)</a:t>
+                      </a:r>
+                      <a:endParaRPr lang="ko-KR" altLang="en-US" dirty="0"/>
+                    </a:p>
+                  </a:txBody>
+                  <a:tcPr>
+                    <a:lnL w="12700" cmpd="sng">
+                      <a:noFill/>
+                    </a:lnL>
+                    <a:lnR w="12700" cmpd="sng">
+                      <a:noFill/>
+                    </a:lnR>
+                    <a:lnT w="38100" cmpd="sng">
+                      <a:noFill/>
+                    </a:lnT>
+                    <a:lnB w="12700" cmpd="sng">
+                      <a:noFill/>
+                    </a:lnB>
+                    <a:lnTlToBr w="12700" cmpd="sng">
+                      <a:noFill/>
+                      <a:prstDash val="solid"/>
+                    </a:lnTlToBr>
+                    <a:lnBlToTr w="12700" cmpd="sng">
+                      <a:noFill/>
+                      <a:prstDash val="solid"/>
+                    </a:lnBlToTr>
+                  </a:tcPr>
+                </a:tc>
+                <a:extLst>
+                  <a:ext uri="{0D108BD9-81ED-4DB2-BD59-A6C34878D82A}">
+                    <a16:rowId xmlns:a16="http://schemas.microsoft.com/office/drawing/2014/main" val="238053089"/>
+                  </a:ext>
+                </a:extLst>
+              </a:tr>
+              <a:tr h="370840">
+                <a:tc>
+                  <a:txBody>
+                    <a:bodyPr/>
+                    <a:lstStyle/>
+                    <a:p>
+                      <a:pPr latinLnBrk="1"/>
+                      <a:r>
+                        <a:rPr lang="ko-KR" altLang="en-US" dirty="0"/>
+                        <a:t>사진</a:t>
+                      </a:r>
+                      <a:r>
+                        <a:rPr lang="en-US" altLang="ko-KR" dirty="0"/>
+                        <a:t>(</a:t>
+                      </a:r>
+                      <a:r>
+                        <a:rPr lang="ko-KR" altLang="en-US" u="sng" dirty="0"/>
+                        <a:t>사진 </a:t>
+                      </a:r>
+                      <a:r>
+                        <a:rPr lang="en-US" altLang="ko-KR" u="sng" dirty="0"/>
+                        <a:t>ID </a:t>
+                      </a:r>
+                      <a:r>
+                        <a:rPr lang="en-US" altLang="ko-KR" i="1" u="sng" dirty="0"/>
+                        <a:t>= </a:t>
+                      </a:r>
+                      <a:r>
+                        <a:rPr lang="ko-KR" altLang="en-US" i="1" u="sng" dirty="0"/>
+                        <a:t>사진이 찍힌 시간</a:t>
+                      </a:r>
+                      <a:r>
+                        <a:rPr lang="en-US" altLang="ko-KR" dirty="0"/>
+                        <a:t>, </a:t>
+                      </a:r>
+                      <a:r>
+                        <a:rPr lang="ko-KR" altLang="en-US" dirty="0"/>
+                        <a:t>사진</a:t>
+                      </a:r>
+                      <a:r>
+                        <a:rPr lang="en-US" altLang="ko-KR" dirty="0"/>
+                        <a:t>, </a:t>
+                      </a:r>
+                      <a:r>
+                        <a:rPr lang="ko-KR" altLang="en-US" dirty="0"/>
+                        <a:t>분석한 사진</a:t>
+                      </a:r>
+                      <a:r>
+                        <a:rPr lang="en-US" altLang="ko-KR" dirty="0"/>
+                        <a:t>, </a:t>
+                      </a:r>
+                      <a:r>
+                        <a:rPr lang="ko-KR" altLang="en-US" dirty="0"/>
+                        <a:t>카메라 </a:t>
+                      </a:r>
+                      <a:r>
+                        <a:rPr lang="en-US" altLang="ko-KR" dirty="0"/>
+                        <a:t>ID) </a:t>
+                      </a:r>
+                      <a:endParaRPr lang="ko-KR" altLang="en-US" dirty="0"/>
+                    </a:p>
+                  </a:txBody>
+                  <a:tcPr>
+                    <a:lnL w="12700" cmpd="sng">
+                      <a:noFill/>
+                    </a:lnL>
+                    <a:lnR w="12700" cmpd="sng">
+                      <a:noFill/>
+                    </a:lnR>
+                    <a:lnT w="12700" cmpd="sng">
+                      <a:noFill/>
+                    </a:lnT>
+                    <a:lnB w="12700" cmpd="sng">
+                      <a:noFill/>
+                    </a:lnB>
+                    <a:lnTlToBr w="12700" cmpd="sng">
+                      <a:noFill/>
+                      <a:prstDash val="solid"/>
+                    </a:lnTlToBr>
+                    <a:lnBlToTr w="12700" cmpd="sng">
+                      <a:noFill/>
+                      <a:prstDash val="solid"/>
+                    </a:lnBlToTr>
+                  </a:tcPr>
+                </a:tc>
+                <a:extLst>
+                  <a:ext uri="{0D108BD9-81ED-4DB2-BD59-A6C34878D82A}">
+                    <a16:rowId xmlns:a16="http://schemas.microsoft.com/office/drawing/2014/main" val="102806007"/>
+                  </a:ext>
+                </a:extLst>
+              </a:tr>
+              <a:tr h="370840">
+                <a:tc>
+                  <a:txBody>
+                    <a:bodyPr/>
+                    <a:lstStyle/>
+                    <a:p>
+                      <a:pPr latinLnBrk="1"/>
+                      <a:r>
+                        <a:rPr lang="ko-KR" altLang="en-US" dirty="0"/>
+                        <a:t>식품</a:t>
+                      </a:r>
+                      <a:r>
+                        <a:rPr lang="en-US" altLang="ko-KR" dirty="0"/>
+                        <a:t>(</a:t>
+                      </a:r>
+                      <a:r>
+                        <a:rPr lang="ko-KR" altLang="en-US" u="sng" dirty="0"/>
+                        <a:t>식품명</a:t>
+                      </a:r>
+                      <a:r>
+                        <a:rPr lang="en-US" altLang="ko-KR" dirty="0"/>
+                        <a:t>, </a:t>
+                      </a:r>
+                      <a:r>
+                        <a:rPr lang="ko-KR" altLang="en-US" dirty="0"/>
+                        <a:t>유통기한</a:t>
+                      </a:r>
+                      <a:r>
+                        <a:rPr lang="en-US" altLang="ko-KR" dirty="0"/>
+                        <a:t>, </a:t>
+                      </a:r>
+                      <a:r>
+                        <a:rPr lang="ko-KR" altLang="en-US" dirty="0"/>
+                        <a:t>영양소</a:t>
+                      </a:r>
+                      <a:r>
+                        <a:rPr lang="en-US" altLang="ko-KR" dirty="0"/>
+                        <a:t>…)</a:t>
+                      </a:r>
+                      <a:endParaRPr lang="ko-KR" altLang="en-US" dirty="0"/>
+                    </a:p>
+                  </a:txBody>
+                  <a:tcPr>
+                    <a:lnL w="12700" cmpd="sng">
+                      <a:noFill/>
+                    </a:lnL>
+                    <a:lnR w="12700" cmpd="sng">
+                      <a:noFill/>
+                    </a:lnR>
+                    <a:lnT w="12700" cmpd="sng">
+                      <a:noFill/>
+                    </a:lnT>
+                    <a:lnB w="12700" cmpd="sng">
+                      <a:noFill/>
+                    </a:lnB>
+                    <a:lnTlToBr w="12700" cmpd="sng">
+                      <a:noFill/>
+                      <a:prstDash val="solid"/>
+                    </a:lnTlToBr>
+                    <a:lnBlToTr w="12700" cmpd="sng">
+                      <a:noFill/>
+                      <a:prstDash val="solid"/>
+                    </a:lnBlToTr>
+                  </a:tcPr>
+                </a:tc>
+                <a:extLst>
+                  <a:ext uri="{0D108BD9-81ED-4DB2-BD59-A6C34878D82A}">
+                    <a16:rowId xmlns:a16="http://schemas.microsoft.com/office/drawing/2014/main" val="2062640950"/>
+                  </a:ext>
+                </a:extLst>
+              </a:tr>
+              <a:tr h="370840">
+                <a:tc>
+                  <a:txBody>
+                    <a:bodyPr/>
+                    <a:lstStyle/>
+                    <a:p>
+                      <a:pPr latinLnBrk="1"/>
+                      <a:r>
+                        <a:rPr lang="ko-KR" altLang="en-US" dirty="0"/>
+                        <a:t>촬영된 식품</a:t>
+                      </a:r>
+                      <a:r>
+                        <a:rPr lang="en-US" altLang="ko-KR" dirty="0"/>
+                        <a:t>(</a:t>
+                      </a:r>
+                      <a:r>
+                        <a:rPr lang="ko-KR" altLang="en-US" u="sng" dirty="0"/>
+                        <a:t>사진 </a:t>
+                      </a:r>
+                      <a:r>
+                        <a:rPr lang="en-US" altLang="ko-KR" u="sng" dirty="0"/>
+                        <a:t>ID, </a:t>
+                      </a:r>
+                      <a:r>
+                        <a:rPr lang="ko-KR" altLang="en-US" u="sng" dirty="0"/>
+                        <a:t>숫자</a:t>
+                      </a:r>
+                      <a:r>
+                        <a:rPr lang="en-US" altLang="ko-KR" dirty="0"/>
+                        <a:t>, </a:t>
+                      </a:r>
+                      <a:r>
+                        <a:rPr lang="ko-KR" altLang="en-US" dirty="0"/>
+                        <a:t>식품명</a:t>
+                      </a:r>
+                      <a:r>
+                        <a:rPr lang="en-US" altLang="ko-KR" dirty="0"/>
+                        <a:t>, </a:t>
+                      </a:r>
+                      <a:r>
+                        <a:rPr lang="ko-KR" altLang="en-US" dirty="0"/>
+                        <a:t>들어온 날</a:t>
+                      </a:r>
+                      <a:r>
+                        <a:rPr lang="en-US" altLang="ko-KR" dirty="0"/>
+                        <a:t>, </a:t>
+                      </a:r>
+                      <a:r>
+                        <a:rPr lang="ko-KR" altLang="en-US" dirty="0"/>
+                        <a:t>설정된 유통기한</a:t>
+                      </a:r>
+                      <a:r>
+                        <a:rPr lang="en-US" altLang="ko-KR" dirty="0"/>
+                        <a:t>, x1,</a:t>
+                      </a:r>
+                      <a:r>
+                        <a:rPr lang="ko-KR" altLang="en-US" dirty="0"/>
+                        <a:t> </a:t>
+                      </a:r>
+                      <a:r>
+                        <a:rPr lang="en-US" altLang="ko-KR" dirty="0"/>
+                        <a:t>x2,</a:t>
+                      </a:r>
+                      <a:r>
+                        <a:rPr lang="ko-KR" altLang="en-US" dirty="0"/>
+                        <a:t> </a:t>
+                      </a:r>
+                      <a:r>
+                        <a:rPr lang="en-US" altLang="ko-KR" dirty="0"/>
+                        <a:t>y1,</a:t>
+                      </a:r>
+                      <a:r>
+                        <a:rPr lang="ko-KR" altLang="en-US" dirty="0"/>
+                        <a:t> </a:t>
+                      </a:r>
+                      <a:r>
+                        <a:rPr lang="en-US" altLang="ko-KR" dirty="0"/>
+                        <a:t>y2)</a:t>
+                      </a:r>
+                      <a:endParaRPr lang="ko-KR" altLang="en-US" dirty="0"/>
+                    </a:p>
+                  </a:txBody>
+                  <a:tcPr>
+                    <a:lnL w="12700" cmpd="sng">
+                      <a:noFill/>
+                    </a:lnL>
+                    <a:lnR w="12700" cmpd="sng">
+                      <a:noFill/>
+                    </a:lnR>
+                    <a:lnT w="12700" cmpd="sng">
+                      <a:noFill/>
+                    </a:lnT>
+                    <a:lnB w="12700" cmpd="sng">
+                      <a:noFill/>
+                    </a:lnB>
+                    <a:lnTlToBr w="12700" cmpd="sng">
+                      <a:noFill/>
+                      <a:prstDash val="solid"/>
+                    </a:lnTlToBr>
+                    <a:lnBlToTr w="12700" cmpd="sng">
+                      <a:noFill/>
+                      <a:prstDash val="solid"/>
+                    </a:lnBlToTr>
+                  </a:tcPr>
+                </a:tc>
+                <a:extLst>
+                  <a:ext uri="{0D108BD9-81ED-4DB2-BD59-A6C34878D82A}">
+                    <a16:rowId xmlns:a16="http://schemas.microsoft.com/office/drawing/2014/main" val="2193079551"/>
+                  </a:ext>
+                </a:extLst>
+              </a:tr>
+              <a:tr h="370840">
+                <a:tc>
+                  <a:txBody>
+                    <a:bodyPr/>
+                    <a:lstStyle/>
+                    <a:p>
+                      <a:pPr latinLnBrk="1"/>
+                      <a:r>
+                        <a:rPr lang="ko-KR" altLang="en-US" dirty="0"/>
+                        <a:t>먹은 식품</a:t>
+                      </a:r>
+                      <a:r>
+                        <a:rPr lang="en-US" altLang="ko-KR" dirty="0"/>
+                        <a:t>(</a:t>
+                      </a:r>
+                      <a:r>
+                        <a:rPr lang="ko-KR" altLang="en-US" dirty="0"/>
+                        <a:t>먹은 시간</a:t>
+                      </a:r>
+                      <a:r>
+                        <a:rPr lang="en-US" altLang="ko-KR" i="1" dirty="0"/>
+                        <a:t>= </a:t>
+                      </a:r>
+                      <a:r>
+                        <a:rPr lang="ko-KR" altLang="en-US" i="1" dirty="0"/>
+                        <a:t>식품이 없어진 사진 </a:t>
+                      </a:r>
+                      <a:r>
+                        <a:rPr lang="en-US" altLang="ko-KR" i="1" dirty="0"/>
+                        <a:t>ID</a:t>
+                      </a:r>
+                      <a:r>
+                        <a:rPr lang="en-US" altLang="ko-KR" dirty="0"/>
+                        <a:t>, </a:t>
+                      </a:r>
+                      <a:r>
+                        <a:rPr lang="ko-KR" altLang="en-US" dirty="0"/>
+                        <a:t>식품명</a:t>
+                      </a:r>
+                      <a:r>
+                        <a:rPr lang="en-US" altLang="ko-KR" dirty="0"/>
+                        <a:t>)</a:t>
+                      </a:r>
+                      <a:endParaRPr lang="ko-KR" altLang="en-US" dirty="0"/>
+                    </a:p>
+                  </a:txBody>
+                  <a:tcPr>
+                    <a:lnL w="12700" cmpd="sng">
+                      <a:noFill/>
+                    </a:lnL>
+                    <a:lnR w="12700" cmpd="sng">
+                      <a:noFill/>
+                    </a:lnR>
+                    <a:lnT w="12700" cmpd="sng">
+                      <a:noFill/>
+                    </a:lnT>
+                    <a:lnB w="12700" cmpd="sng">
+                      <a:noFill/>
+                    </a:lnB>
+                    <a:lnTlToBr w="12700" cmpd="sng">
+                      <a:noFill/>
+                      <a:prstDash val="solid"/>
+                    </a:lnTlToBr>
+                    <a:lnBlToTr w="12700" cmpd="sng">
+                      <a:noFill/>
+                      <a:prstDash val="solid"/>
+                    </a:lnBlToTr>
+                  </a:tcPr>
+                </a:tc>
+                <a:extLst>
+                  <a:ext uri="{0D108BD9-81ED-4DB2-BD59-A6C34878D82A}">
+                    <a16:rowId xmlns:a16="http://schemas.microsoft.com/office/drawing/2014/main" val="1893238398"/>
+                  </a:ext>
+                </a:extLst>
+              </a:tr>
+              <a:tr h="370840">
+                <a:tc>
+                  <a:txBody>
+                    <a:bodyPr/>
+                    <a:lstStyle/>
+                    <a:p>
+                      <a:pPr latinLnBrk="1"/>
+                      <a:r>
+                        <a:rPr lang="ko-KR" altLang="en-US" dirty="0"/>
+                        <a:t>레시피</a:t>
+                      </a:r>
+                      <a:r>
+                        <a:rPr lang="en-US" altLang="ko-KR" dirty="0"/>
+                        <a:t>(</a:t>
+                      </a:r>
+                      <a:r>
+                        <a:rPr lang="ko-KR" altLang="en-US" u="sng" dirty="0" err="1"/>
+                        <a:t>레시피명</a:t>
+                      </a:r>
+                      <a:r>
+                        <a:rPr lang="en-US" altLang="ko-KR" dirty="0"/>
+                        <a:t>, </a:t>
+                      </a:r>
+                      <a:r>
+                        <a:rPr lang="ko-KR" altLang="en-US" dirty="0"/>
+                        <a:t>사진</a:t>
+                      </a:r>
+                      <a:r>
+                        <a:rPr lang="en-US" altLang="ko-KR" dirty="0"/>
+                        <a:t>, </a:t>
+                      </a:r>
+                      <a:r>
+                        <a:rPr lang="ko-KR" altLang="en-US" dirty="0"/>
+                        <a:t>조리과정</a:t>
+                      </a:r>
+                      <a:r>
+                        <a:rPr lang="en-US" altLang="ko-KR" dirty="0"/>
+                        <a:t>, </a:t>
+                      </a:r>
+                      <a:r>
+                        <a:rPr lang="ko-KR" altLang="en-US" dirty="0"/>
+                        <a:t>조리시간</a:t>
+                      </a:r>
+                      <a:r>
+                        <a:rPr lang="en-US" altLang="ko-KR" dirty="0"/>
+                        <a:t>, </a:t>
+                      </a:r>
+                      <a:r>
+                        <a:rPr lang="ko-KR" altLang="en-US" dirty="0"/>
+                        <a:t>난이도</a:t>
+                      </a:r>
+                      <a:r>
+                        <a:rPr lang="en-US" altLang="ko-KR" dirty="0"/>
+                        <a:t>, </a:t>
+                      </a:r>
+                      <a:r>
+                        <a:rPr lang="ko-KR" altLang="en-US" dirty="0"/>
+                        <a:t>종류</a:t>
+                      </a:r>
+                      <a:r>
+                        <a:rPr lang="en-US" altLang="ko-KR" dirty="0"/>
+                        <a:t>, </a:t>
+                      </a:r>
+                      <a:r>
+                        <a:rPr lang="ko-KR" altLang="en-US" dirty="0"/>
+                        <a:t>조리법</a:t>
+                      </a:r>
+                      <a:r>
+                        <a:rPr lang="en-US" altLang="ko-KR" dirty="0"/>
+                        <a:t>)</a:t>
+                      </a:r>
+                      <a:endParaRPr lang="ko-KR" altLang="en-US" dirty="0"/>
+                    </a:p>
+                  </a:txBody>
+                  <a:tcPr>
+                    <a:lnL w="12700" cmpd="sng">
+                      <a:noFill/>
+                    </a:lnL>
+                    <a:lnR w="12700" cmpd="sng">
+                      <a:noFill/>
+                    </a:lnR>
+                    <a:lnT w="12700" cmpd="sng">
+                      <a:noFill/>
+                    </a:lnT>
+                    <a:lnB w="12700" cmpd="sng">
+                      <a:noFill/>
+                    </a:lnB>
+                    <a:lnTlToBr w="12700" cmpd="sng">
+                      <a:noFill/>
+                      <a:prstDash val="solid"/>
+                    </a:lnTlToBr>
+                    <a:lnBlToTr w="12700" cmpd="sng">
+                      <a:noFill/>
+                      <a:prstDash val="solid"/>
+                    </a:lnBlToTr>
+                  </a:tcPr>
+                </a:tc>
+                <a:extLst>
+                  <a:ext uri="{0D108BD9-81ED-4DB2-BD59-A6C34878D82A}">
+                    <a16:rowId xmlns:a16="http://schemas.microsoft.com/office/drawing/2014/main" val="4284759413"/>
+                  </a:ext>
+                </a:extLst>
+              </a:tr>
+              <a:tr h="370840">
+                <a:tc>
+                  <a:txBody>
+                    <a:bodyPr/>
+                    <a:lstStyle/>
+                    <a:p>
+                      <a:pPr marL="0" marR="0" lvl="0" indent="0" algn="l" defTabSz="914400" rtl="0" eaLnBrk="1" fontAlgn="auto" latinLnBrk="1" hangingPunct="1">
+                        <a:lnSpc>
+                          <a:spcPct val="100000"/>
+                        </a:lnSpc>
+                        <a:spcBef>
+                          <a:spcPts val="0"/>
+                        </a:spcBef>
+                        <a:spcAft>
+                          <a:spcPts val="0"/>
+                        </a:spcAft>
+                        <a:buClrTx/>
+                        <a:buSzTx/>
+                        <a:buFontTx/>
+                        <a:buNone/>
+                        <a:tabLst/>
+                        <a:defRPr/>
+                      </a:pPr>
+                      <a:r>
+                        <a:rPr lang="ko-KR" altLang="en-US" dirty="0"/>
+                        <a:t>재료</a:t>
+                      </a:r>
+                      <a:r>
+                        <a:rPr lang="en-US" altLang="ko-KR" dirty="0"/>
+                        <a:t>(</a:t>
+                      </a:r>
+                      <a:r>
+                        <a:rPr lang="ko-KR" altLang="en-US" u="sng" dirty="0" err="1"/>
+                        <a:t>레시피명</a:t>
+                      </a:r>
+                      <a:r>
+                        <a:rPr lang="en-US" altLang="ko-KR" u="none" dirty="0"/>
+                        <a:t>, </a:t>
+                      </a:r>
+                      <a:r>
+                        <a:rPr lang="ko-KR" altLang="en-US" u="none" dirty="0"/>
+                        <a:t>식품명</a:t>
+                      </a:r>
+                      <a:r>
+                        <a:rPr lang="en-US" altLang="ko-KR" u="none" dirty="0"/>
+                        <a:t>, </a:t>
+                      </a:r>
+                      <a:r>
+                        <a:rPr lang="ko-KR" altLang="en-US" u="none" dirty="0"/>
+                        <a:t>계량</a:t>
+                      </a:r>
+                      <a:r>
+                        <a:rPr lang="en-US" altLang="ko-KR" dirty="0"/>
+                        <a:t>)</a:t>
+                      </a:r>
+                      <a:endParaRPr lang="ko-KR" altLang="en-US" dirty="0"/>
+                    </a:p>
+                  </a:txBody>
+                  <a:tcPr>
+                    <a:lnL w="12700" cmpd="sng">
+                      <a:noFill/>
+                    </a:lnL>
+                    <a:lnR w="12700" cmpd="sng">
+                      <a:noFill/>
+                    </a:lnR>
+                    <a:lnT w="12700" cmpd="sng">
+                      <a:noFill/>
+                    </a:lnT>
+                    <a:lnB w="12700" cmpd="sng">
+                      <a:noFill/>
+                    </a:lnB>
+                    <a:lnTlToBr w="12700" cmpd="sng">
+                      <a:noFill/>
+                      <a:prstDash val="solid"/>
+                    </a:lnTlToBr>
+                    <a:lnBlToTr w="12700" cmpd="sng">
+                      <a:noFill/>
+                      <a:prstDash val="solid"/>
+                    </a:lnBlToTr>
+                  </a:tcPr>
+                </a:tc>
+                <a:extLst>
+                  <a:ext uri="{0D108BD9-81ED-4DB2-BD59-A6C34878D82A}">
+                    <a16:rowId xmlns:a16="http://schemas.microsoft.com/office/drawing/2014/main" val="1849757899"/>
+                  </a:ext>
+                </a:extLst>
+              </a:tr>
+              <a:tr h="370840">
+                <a:tc>
+                  <a:txBody>
+                    <a:bodyPr/>
+                    <a:lstStyle/>
+                    <a:p>
+                      <a:pPr latinLnBrk="1"/>
+                      <a:r>
+                        <a:rPr lang="ko-KR" altLang="en-US" dirty="0"/>
+                        <a:t>권장 영양 섭취량</a:t>
+                      </a:r>
+                      <a:r>
+                        <a:rPr lang="en-US" altLang="ko-KR" dirty="0"/>
+                        <a:t>(</a:t>
+                      </a:r>
+                      <a:r>
+                        <a:rPr lang="ko-KR" altLang="en-US" u="sng" dirty="0"/>
+                        <a:t>연령</a:t>
+                      </a:r>
+                      <a:r>
+                        <a:rPr lang="en-US" altLang="ko-KR" u="sng" dirty="0"/>
+                        <a:t>, </a:t>
+                      </a:r>
+                      <a:r>
+                        <a:rPr lang="ko-KR" altLang="en-US" u="sng" dirty="0"/>
+                        <a:t>성별</a:t>
+                      </a:r>
+                      <a:r>
+                        <a:rPr lang="en-US" altLang="ko-KR" dirty="0"/>
+                        <a:t>, </a:t>
+                      </a:r>
+                      <a:r>
+                        <a:rPr lang="ko-KR" altLang="en-US" dirty="0"/>
+                        <a:t>영양소</a:t>
+                      </a:r>
+                      <a:r>
+                        <a:rPr lang="en-US" altLang="ko-KR" dirty="0"/>
+                        <a:t>…) </a:t>
+                      </a:r>
+                      <a:endParaRPr lang="ko-KR" altLang="en-US" dirty="0"/>
+                    </a:p>
+                  </a:txBody>
+                  <a:tcPr>
+                    <a:lnL w="12700" cmpd="sng">
+                      <a:noFill/>
+                    </a:lnL>
+                    <a:lnR w="12700" cmpd="sng">
+                      <a:noFill/>
+                    </a:lnR>
+                    <a:lnT w="12700" cmpd="sng">
+                      <a:noFill/>
+                    </a:lnT>
+                    <a:lnB w="12700" cmpd="sng">
+                      <a:noFill/>
+                    </a:lnB>
+                    <a:lnTlToBr w="12700" cmpd="sng">
+                      <a:noFill/>
+                      <a:prstDash val="solid"/>
+                    </a:lnTlToBr>
+                    <a:lnBlToTr w="12700" cmpd="sng">
+                      <a:noFill/>
+                      <a:prstDash val="solid"/>
+                    </a:lnBlToTr>
+                  </a:tcPr>
+                </a:tc>
+                <a:extLst>
+                  <a:ext uri="{0D108BD9-81ED-4DB2-BD59-A6C34878D82A}">
+                    <a16:rowId xmlns:a16="http://schemas.microsoft.com/office/drawing/2014/main" val="3216231887"/>
+                  </a:ext>
+                </a:extLst>
+              </a:tr>
+              <a:tr h="370840">
+                <a:tc>
+                  <a:txBody>
+                    <a:bodyPr/>
+                    <a:lstStyle/>
+                    <a:p>
+                      <a:pPr latinLnBrk="1"/>
+                      <a:r>
+                        <a:rPr lang="ko-KR" altLang="en-US" dirty="0"/>
+                        <a:t>제외 식품</a:t>
+                      </a:r>
+                      <a:r>
+                        <a:rPr lang="en-US" altLang="ko-KR" dirty="0"/>
+                        <a:t>(</a:t>
+                      </a:r>
+                      <a:r>
+                        <a:rPr lang="en-US" altLang="ko-KR" b="0" u="sng" dirty="0">
+                          <a:solidFill>
+                            <a:schemeClr val="tx1"/>
+                          </a:solidFill>
+                        </a:rPr>
+                        <a:t>E-mail</a:t>
+                      </a:r>
+                      <a:r>
+                        <a:rPr lang="en-US" altLang="ko-KR" u="sng" dirty="0"/>
+                        <a:t>, </a:t>
+                      </a:r>
+                      <a:r>
+                        <a:rPr lang="ko-KR" altLang="en-US" u="sng" dirty="0"/>
+                        <a:t>식품명</a:t>
+                      </a:r>
+                      <a:r>
+                        <a:rPr lang="en-US" altLang="ko-KR" i="0" u="none" dirty="0"/>
+                        <a:t>)</a:t>
+                      </a:r>
+                      <a:endParaRPr lang="ko-KR" altLang="en-US" dirty="0"/>
+                    </a:p>
+                  </a:txBody>
+                  <a:tcPr>
+                    <a:lnL w="12700" cmpd="sng">
+                      <a:noFill/>
+                    </a:lnL>
+                    <a:lnR w="12700" cmpd="sng">
+                      <a:noFill/>
+                    </a:lnR>
+                    <a:lnT w="12700" cmpd="sng">
+                      <a:noFill/>
+                    </a:lnT>
+                    <a:lnB w="12700" cmpd="sng">
+                      <a:noFill/>
+                    </a:lnB>
+                    <a:lnTlToBr w="12700" cmpd="sng">
+                      <a:noFill/>
+                      <a:prstDash val="solid"/>
+                    </a:lnTlToBr>
+                    <a:lnBlToTr w="12700" cmpd="sng">
+                      <a:noFill/>
+                      <a:prstDash val="solid"/>
+                    </a:lnBlToTr>
+                  </a:tcPr>
+                </a:tc>
+                <a:extLst>
+                  <a:ext uri="{0D108BD9-81ED-4DB2-BD59-A6C34878D82A}">
+                    <a16:rowId xmlns:a16="http://schemas.microsoft.com/office/drawing/2014/main" val="2850089586"/>
+                  </a:ext>
+                </a:extLst>
+              </a:tr>
+              <a:tr h="370840">
+                <a:tc>
+                  <a:txBody>
+                    <a:bodyPr/>
+                    <a:lstStyle/>
+                    <a:p>
+                      <a:pPr latinLnBrk="1"/>
+                      <a:r>
+                        <a:rPr lang="ko-KR" altLang="en-US" dirty="0"/>
+                        <a:t>회원 레시피 선호도</a:t>
+                      </a:r>
+                      <a:r>
+                        <a:rPr lang="en-US" altLang="ko-KR" dirty="0"/>
+                        <a:t>(</a:t>
+                      </a:r>
+                      <a:r>
+                        <a:rPr lang="en-US" altLang="ko-KR" b="0" u="sng" dirty="0">
+                          <a:solidFill>
+                            <a:schemeClr val="tx1"/>
+                          </a:solidFill>
+                        </a:rPr>
+                        <a:t>E-mail</a:t>
+                      </a:r>
+                      <a:r>
+                        <a:rPr lang="en-US" altLang="ko-KR" u="sng" dirty="0"/>
+                        <a:t>, </a:t>
+                      </a:r>
+                      <a:r>
+                        <a:rPr lang="ko-KR" altLang="en-US" u="sng" dirty="0" err="1"/>
+                        <a:t>레시피명</a:t>
+                      </a:r>
+                      <a:r>
+                        <a:rPr lang="en-US" altLang="ko-KR" u="none" dirty="0"/>
+                        <a:t>, </a:t>
+                      </a:r>
+                      <a:r>
+                        <a:rPr lang="ko-KR" altLang="en-US" u="none" dirty="0"/>
+                        <a:t>선호도 점수</a:t>
+                      </a:r>
+                      <a:r>
+                        <a:rPr lang="en-US" altLang="ko-KR" u="none" dirty="0"/>
+                        <a:t>)</a:t>
+                      </a:r>
+                    </a:p>
+                  </a:txBody>
+                  <a:tcPr>
+                    <a:lnL w="12700" cmpd="sng">
+                      <a:noFill/>
+                    </a:lnL>
+                    <a:lnR w="12700" cmpd="sng">
+                      <a:noFill/>
+                    </a:lnR>
+                    <a:lnT w="12700" cmpd="sng">
+                      <a:noFill/>
+                    </a:lnT>
+                    <a:lnB w="12700" cmpd="sng">
+                      <a:noFill/>
+                    </a:lnB>
+                    <a:lnTlToBr w="12700" cmpd="sng">
+                      <a:noFill/>
+                      <a:prstDash val="solid"/>
+                    </a:lnTlToBr>
+                    <a:lnBlToTr w="12700" cmpd="sng">
+                      <a:noFill/>
+                      <a:prstDash val="solid"/>
+                    </a:lnBlToTr>
+                  </a:tcPr>
+                </a:tc>
+                <a:extLst>
+                  <a:ext uri="{0D108BD9-81ED-4DB2-BD59-A6C34878D82A}">
+                    <a16:rowId xmlns:a16="http://schemas.microsoft.com/office/drawing/2014/main" val="3439442392"/>
+                  </a:ext>
+                </a:extLst>
+              </a:tr>
+              <a:tr h="370840">
+                <a:tc>
+                  <a:txBody>
+                    <a:bodyPr/>
+                    <a:lstStyle/>
+                    <a:p>
+                      <a:pPr latinLnBrk="1"/>
+                      <a:r>
+                        <a:rPr lang="ko-KR" altLang="en-US" u="none" dirty="0"/>
+                        <a:t>인증 메일</a:t>
+                      </a:r>
+                      <a:r>
+                        <a:rPr lang="en-US" altLang="ko-KR" u="none" dirty="0"/>
+                        <a:t>(</a:t>
+                      </a:r>
+                      <a:r>
+                        <a:rPr lang="en-US" altLang="ko-KR" u="sng" dirty="0"/>
+                        <a:t>E-mail, </a:t>
+                      </a:r>
+                      <a:r>
+                        <a:rPr lang="ko-KR" altLang="en-US" u="sng" dirty="0"/>
+                        <a:t>보낸 시간</a:t>
+                      </a:r>
+                      <a:r>
+                        <a:rPr lang="en-US" altLang="ko-KR" u="none" dirty="0"/>
+                        <a:t>, </a:t>
+                      </a:r>
+                      <a:r>
+                        <a:rPr lang="ko-KR" altLang="en-US" u="none" dirty="0"/>
+                        <a:t>인증번호</a:t>
+                      </a:r>
+                      <a:r>
+                        <a:rPr lang="en-US" altLang="ko-KR" u="none" dirty="0"/>
+                        <a:t>)</a:t>
+                      </a:r>
+                    </a:p>
+                  </a:txBody>
+                  <a:tcPr>
+                    <a:lnL w="12700" cmpd="sng">
+                      <a:noFill/>
+                    </a:lnL>
+                    <a:lnR w="12700" cmpd="sng">
+                      <a:noFill/>
+                    </a:lnR>
+                    <a:lnT w="12700" cmpd="sng">
+                      <a:noFill/>
+                    </a:lnT>
+                    <a:lnB w="12700" cmpd="sng">
+                      <a:noFill/>
+                    </a:lnB>
+                    <a:lnTlToBr w="12700" cmpd="sng">
+                      <a:noFill/>
+                      <a:prstDash val="solid"/>
+                    </a:lnTlToBr>
+                    <a:lnBlToTr w="12700" cmpd="sng">
+                      <a:noFill/>
+                      <a:prstDash val="solid"/>
+                    </a:lnBlToTr>
+                  </a:tcPr>
+                </a:tc>
+                <a:extLst>
+                  <a:ext uri="{0D108BD9-81ED-4DB2-BD59-A6C34878D82A}">
+                    <a16:rowId xmlns:a16="http://schemas.microsoft.com/office/drawing/2014/main" val="634814127"/>
+                  </a:ext>
+                </a:extLst>
+              </a:tr>
+              <a:tr h="370840">
+                <a:tc>
+                  <a:txBody>
+                    <a:bodyPr/>
+                    <a:lstStyle/>
+                    <a:p>
+                      <a:pPr latinLnBrk="1"/>
+                      <a:r>
+                        <a:rPr lang="ko-KR" altLang="en-US" u="none" dirty="0"/>
+                        <a:t>레시피 추천 메일</a:t>
+                      </a:r>
+                      <a:r>
+                        <a:rPr lang="en-US" altLang="ko-KR" u="none" dirty="0"/>
+                        <a:t>(</a:t>
+                      </a:r>
+                      <a:r>
+                        <a:rPr lang="en-US" altLang="ko-KR" u="sng" dirty="0"/>
+                        <a:t>E-mail, </a:t>
+                      </a:r>
+                      <a:r>
+                        <a:rPr lang="ko-KR" altLang="en-US" u="sng" dirty="0"/>
+                        <a:t>보낸 시간</a:t>
+                      </a:r>
+                      <a:r>
+                        <a:rPr lang="en-US" altLang="ko-KR" u="none" dirty="0"/>
+                        <a:t>, </a:t>
+                      </a:r>
+                      <a:r>
+                        <a:rPr lang="ko-KR" altLang="en-US" u="none" dirty="0"/>
+                        <a:t>레시피 명</a:t>
+                      </a:r>
+                      <a:r>
+                        <a:rPr lang="en-US" altLang="ko-KR" u="none" dirty="0"/>
+                        <a:t>)</a:t>
+                      </a:r>
+                    </a:p>
+                  </a:txBody>
+                  <a:tcPr>
+                    <a:lnL w="12700" cmpd="sng">
+                      <a:noFill/>
+                    </a:lnL>
+                    <a:lnR w="12700" cmpd="sng">
+                      <a:noFill/>
+                    </a:lnR>
+                    <a:lnT w="12700" cmpd="sng">
+                      <a:noFill/>
+                    </a:lnT>
+                    <a:lnB w="12700" cmpd="sng">
+                      <a:noFill/>
+                    </a:lnB>
+                    <a:lnTlToBr w="12700" cmpd="sng">
+                      <a:noFill/>
+                      <a:prstDash val="solid"/>
+                    </a:lnTlToBr>
+                    <a:lnBlToTr w="12700" cmpd="sng">
+                      <a:noFill/>
+                      <a:prstDash val="solid"/>
+                    </a:lnBlToTr>
+                  </a:tcPr>
+                </a:tc>
+                <a:extLst>
+                  <a:ext uri="{0D108BD9-81ED-4DB2-BD59-A6C34878D82A}">
+                    <a16:rowId xmlns:a16="http://schemas.microsoft.com/office/drawing/2014/main" val="3995220042"/>
+                  </a:ext>
+                </a:extLst>
+              </a:tr>
+            </a:tbl>
+          </a:graphicData>
+        </a:graphic>
+      </p:graphicFrame>
+      <p:sp>
+        <p:nvSpPr>
+          <p:cNvPr id="3" name="TextBox 2">
+            <a:extLst>
+              <a:ext uri="{FF2B5EF4-FFF2-40B4-BE49-F238E27FC236}">
+                <a16:creationId xmlns:a16="http://schemas.microsoft.com/office/drawing/2014/main" id="{32D12CF3-4F38-4A42-8ADF-6097FD78772E}"/>
+              </a:ext>
+            </a:extLst>
+          </p:cNvPr>
+          <p:cNvSpPr txBox="1"/>
+          <p:nvPr/>
+        </p:nvSpPr>
+        <p:spPr>
+          <a:xfrm>
+            <a:off x="7639664" y="6488189"/>
+            <a:ext cx="4680156" cy="369332"/>
+          </a:xfrm>
+          <a:prstGeom prst="rect">
+            <a:avLst/>
+          </a:prstGeom>
+          <a:noFill/>
+        </p:spPr>
+        <p:txBody>
+          <a:bodyPr wrap="square" rtlCol="0">
+            <a:spAutoFit/>
+          </a:bodyPr>
+          <a:lstStyle/>
+          <a:p>
+            <a:r>
+              <a:rPr lang="ko-KR" altLang="en-US" dirty="0"/>
+              <a:t>이미지 전송 임시 테이블</a:t>
+            </a:r>
+            <a:r>
+              <a:rPr lang="en-US" altLang="ko-KR" dirty="0"/>
+              <a:t>(num, data)</a:t>
+            </a:r>
+          </a:p>
+        </p:txBody>
+      </p:sp>
+      <p:sp>
+        <p:nvSpPr>
+          <p:cNvPr id="6" name="직사각형 5">
+            <a:extLst>
+              <a:ext uri="{FF2B5EF4-FFF2-40B4-BE49-F238E27FC236}">
+                <a16:creationId xmlns:a16="http://schemas.microsoft.com/office/drawing/2014/main" id="{B4E8C1BD-EACF-4336-AC1F-456B81C93FFF}"/>
+              </a:ext>
+            </a:extLst>
+          </p:cNvPr>
+          <p:cNvSpPr/>
+          <p:nvPr/>
+        </p:nvSpPr>
+        <p:spPr>
+          <a:xfrm>
+            <a:off x="9373934" y="776749"/>
+            <a:ext cx="2743200" cy="2753032"/>
+          </a:xfrm>
+          <a:prstGeom prst="rect">
+            <a:avLst/>
+          </a:prstGeom>
+        </p:spPr>
+        <p:style>
+          <a:lnRef idx="2">
+            <a:schemeClr val="accent4"/>
+          </a:lnRef>
+          <a:fillRef idx="1">
+            <a:schemeClr val="lt1"/>
+          </a:fillRef>
+          <a:effectRef idx="0">
+            <a:schemeClr val="accent4"/>
+          </a:effectRef>
+          <a:fontRef idx="minor">
+            <a:schemeClr val="dk1"/>
+          </a:fontRef>
+        </p:style>
+        <p:txBody>
+          <a:bodyPr rtlCol="0" anchor="ctr"/>
+          <a:lstStyle/>
+          <a:p>
+            <a:pPr algn="ctr"/>
+            <a:r>
+              <a:rPr lang="ko-KR" altLang="en-US" dirty="0"/>
+              <a:t>영양소</a:t>
+            </a:r>
+            <a:endParaRPr lang="en-US" altLang="ko-KR" dirty="0"/>
+          </a:p>
+          <a:p>
+            <a:r>
+              <a:rPr lang="ko-KR" altLang="en-US" dirty="0"/>
+              <a:t>에너지</a:t>
+            </a:r>
+          </a:p>
+          <a:p>
+            <a:r>
+              <a:rPr lang="ko-KR" altLang="en-US" dirty="0"/>
+              <a:t>탄수화물</a:t>
+            </a:r>
+            <a:r>
+              <a:rPr lang="en-US" altLang="ko-KR" dirty="0"/>
+              <a:t>-</a:t>
+            </a:r>
+            <a:r>
+              <a:rPr lang="ko-KR" altLang="en-US" dirty="0"/>
+              <a:t>당류</a:t>
+            </a:r>
+            <a:r>
+              <a:rPr lang="en-US" altLang="ko-KR" dirty="0"/>
+              <a:t>, </a:t>
+            </a:r>
+            <a:r>
+              <a:rPr lang="ko-KR" altLang="en-US" dirty="0" err="1"/>
+              <a:t>식이섬유</a:t>
+            </a:r>
+            <a:endParaRPr lang="ko-KR" altLang="en-US" dirty="0"/>
+          </a:p>
+          <a:p>
+            <a:r>
+              <a:rPr lang="ko-KR" altLang="en-US" dirty="0"/>
+              <a:t>단백질</a:t>
+            </a:r>
+            <a:endParaRPr lang="en-US" altLang="ko-KR" dirty="0"/>
+          </a:p>
+          <a:p>
+            <a:r>
+              <a:rPr lang="ko-KR" altLang="en-US" dirty="0"/>
+              <a:t>지방-트랜스, 포화</a:t>
+            </a:r>
+            <a:endParaRPr lang="en-US" altLang="ko-KR" dirty="0"/>
+          </a:p>
+          <a:p>
+            <a:r>
+              <a:rPr lang="ko-KR" altLang="en-US" dirty="0" err="1"/>
+              <a:t>콜레스트롤</a:t>
+            </a:r>
+            <a:endParaRPr lang="ko-KR" altLang="en-US" dirty="0"/>
+          </a:p>
+          <a:p>
+            <a:r>
+              <a:rPr lang="ko-KR" altLang="en-US" dirty="0"/>
+              <a:t>칼슘</a:t>
+            </a:r>
+          </a:p>
+          <a:p>
+            <a:r>
+              <a:rPr lang="ko-KR" altLang="en-US" dirty="0"/>
+              <a:t>나트륨</a:t>
+            </a:r>
+          </a:p>
+          <a:p>
+            <a:r>
+              <a:rPr lang="ko-KR" altLang="en-US" dirty="0"/>
+              <a:t>비타민 </a:t>
+            </a:r>
+            <a:r>
+              <a:rPr lang="ko-KR" altLang="en-US" dirty="0" err="1"/>
+              <a:t>A</a:t>
+            </a:r>
+            <a:r>
+              <a:rPr lang="ko-KR" altLang="en-US" dirty="0"/>
+              <a:t>, </a:t>
+            </a:r>
+            <a:r>
+              <a:rPr lang="ko-KR" altLang="en-US" dirty="0" err="1"/>
+              <a:t>B</a:t>
+            </a:r>
+            <a:r>
+              <a:rPr lang="ko-KR" altLang="en-US" dirty="0"/>
+              <a:t>, C, </a:t>
+            </a:r>
+            <a:r>
+              <a:rPr lang="ko-KR" altLang="en-US" dirty="0" err="1"/>
+              <a:t>D</a:t>
+            </a:r>
+            <a:r>
+              <a:rPr lang="ko-KR" altLang="en-US" dirty="0"/>
+              <a:t>, </a:t>
+            </a:r>
+            <a:r>
+              <a:rPr lang="en-US" altLang="ko-KR" dirty="0"/>
+              <a:t>E</a:t>
+            </a:r>
+            <a:r>
+              <a:rPr lang="ko-KR" altLang="en-US" dirty="0"/>
+              <a:t> </a:t>
+            </a:r>
+          </a:p>
+        </p:txBody>
+      </p:sp>
+    </p:spTree>
+    <p:extLst>
+      <p:ext uri="{BB962C8B-B14F-4D97-AF65-F5344CB8AC3E}">
+        <p14:creationId xmlns:p14="http://schemas.microsoft.com/office/powerpoint/2010/main" val="2534098485"/>
+      </p:ext>
+    </p:extLst>
+  </p:cSld>
+  <p:clrMapOvr>
+    <a:masterClrMapping/>
+  </p:clrMapOvr>
+</p:sld>
+</file>
+
+<file path=ppt/slides/slide3.xml><?xml version="1.0" encoding="utf-8"?>
+<p:sld xmlns:a="http://schemas.openxmlformats.org/drawingml/2006/main" xmlns:r="http://schemas.openxmlformats.org/officeDocument/2006/relationships" xmlns:p="http://schemas.openxmlformats.org/presentationml/2006/main">
+  <p:cSld>
+    <p:spTree>
+      <p:nvGrpSpPr>
+        <p:cNvPr id="1" name=""/>
+        <p:cNvGrpSpPr/>
+        <p:nvPr/>
+      </p:nvGrpSpPr>
+      <p:grpSpPr>
+        <a:xfrm>
+          <a:off x="0" y="0"/>
+          <a:ext cx="0" cy="0"/>
+          <a:chOff x="0" y="0"/>
+          <a:chExt cx="0" cy="0"/>
+        </a:xfrm>
+      </p:grpSpPr>
+      <p:sp>
+        <p:nvSpPr>
+          <p:cNvPr id="2" name="제목 1">
+            <a:extLst>
+              <a:ext uri="{FF2B5EF4-FFF2-40B4-BE49-F238E27FC236}">
+                <a16:creationId xmlns:a16="http://schemas.microsoft.com/office/drawing/2014/main" id="{FFFEF0D2-275E-4B68-84D5-0C0357AD02F9}"/>
+              </a:ext>
+            </a:extLst>
+          </p:cNvPr>
+          <p:cNvSpPr>
+            <a:spLocks noGrp="1"/>
+          </p:cNvSpPr>
+          <p:nvPr>
+            <p:ph type="title"/>
+          </p:nvPr>
+        </p:nvSpPr>
+        <p:spPr/>
+        <p:txBody>
+          <a:bodyPr/>
+          <a:lstStyle/>
+          <a:p>
+            <a:r>
+              <a:rPr lang="ko-KR" altLang="en-US" dirty="0"/>
+              <a:t>기타</a:t>
+            </a:r>
+          </a:p>
+        </p:txBody>
+      </p:sp>
+      <p:sp>
+        <p:nvSpPr>
+          <p:cNvPr id="4" name="내용 개체 틀 3">
+            <a:extLst>
+              <a:ext uri="{FF2B5EF4-FFF2-40B4-BE49-F238E27FC236}">
+                <a16:creationId xmlns:a16="http://schemas.microsoft.com/office/drawing/2014/main" id="{9BC24E0C-3D4E-45E6-BCD2-D85A5A52DEB6}"/>
+              </a:ext>
+            </a:extLst>
+          </p:cNvPr>
+          <p:cNvSpPr txBox="1">
+            <a:spLocks noGrp="1"/>
+          </p:cNvSpPr>
+          <p:nvPr>
+            <p:ph idx="1"/>
+          </p:nvPr>
+        </p:nvSpPr>
+        <p:spPr>
+          <a:xfrm>
+            <a:off x="838200" y="1825625"/>
+            <a:ext cx="10515600" cy="2932085"/>
+          </a:xfrm>
+          <a:prstGeom prst="rect">
+            <a:avLst/>
+          </a:prstGeom>
+          <a:noFill/>
+        </p:spPr>
+        <p:txBody>
+          <a:bodyPr wrap="square" rtlCol="0">
+            <a:spAutoFit/>
+          </a:bodyPr>
+          <a:lstStyle/>
+          <a:p>
+            <a:r>
+              <a:rPr lang="ko-KR" altLang="en-US" dirty="0"/>
+              <a:t>먹은 식품</a:t>
+            </a:r>
+            <a:r>
+              <a:rPr lang="en-US" altLang="ko-KR" dirty="0"/>
+              <a:t>, </a:t>
+            </a:r>
+            <a:r>
+              <a:rPr lang="ko-KR" altLang="en-US" dirty="0"/>
+              <a:t>인증 메일</a:t>
+            </a:r>
+            <a:r>
+              <a:rPr lang="en-US" altLang="ko-KR" dirty="0"/>
+              <a:t>, </a:t>
+            </a:r>
+            <a:r>
+              <a:rPr lang="ko-KR" altLang="en-US" dirty="0"/>
+              <a:t>레시피 추천 메일은 </a:t>
+            </a:r>
+            <a:r>
+              <a:rPr lang="en-US" altLang="ko-KR" dirty="0"/>
+              <a:t>24</a:t>
+            </a:r>
+            <a:r>
+              <a:rPr lang="ko-KR" altLang="en-US" dirty="0"/>
+              <a:t>시간 지나면 삭제</a:t>
+            </a:r>
+            <a:endParaRPr lang="en-US" altLang="ko-KR" dirty="0"/>
+          </a:p>
+          <a:p>
+            <a:r>
+              <a:rPr lang="ko-KR" altLang="en-US" dirty="0"/>
+              <a:t>사진 테이블에 사진과</a:t>
+            </a:r>
+            <a:r>
+              <a:rPr lang="en-US" altLang="ko-KR" dirty="0"/>
+              <a:t> </a:t>
+            </a:r>
+            <a:r>
+              <a:rPr lang="ko-KR" altLang="en-US" dirty="0"/>
+              <a:t>분석한 사진은 한 달이 지나면 삭제</a:t>
+            </a:r>
+            <a:endParaRPr lang="en-US" altLang="ko-KR" dirty="0"/>
+          </a:p>
+          <a:p>
+            <a:endParaRPr lang="en-US" altLang="ko-KR" dirty="0"/>
+          </a:p>
+          <a:p>
+            <a:r>
+              <a:rPr lang="ko-KR" altLang="en-US" dirty="0"/>
+              <a:t>레시피 종류는 육류</a:t>
+            </a:r>
+            <a:r>
+              <a:rPr lang="en-US" altLang="ko-KR" dirty="0"/>
+              <a:t>, </a:t>
+            </a:r>
+            <a:r>
+              <a:rPr lang="ko-KR" altLang="en-US" dirty="0"/>
+              <a:t>채소류</a:t>
+            </a:r>
+            <a:r>
+              <a:rPr lang="en-US" altLang="ko-KR" dirty="0"/>
+              <a:t>, </a:t>
+            </a:r>
+            <a:r>
+              <a:rPr lang="ko-KR" altLang="en-US" dirty="0"/>
+              <a:t>해산물</a:t>
+            </a:r>
+            <a:r>
+              <a:rPr lang="en-US" altLang="ko-KR" dirty="0"/>
+              <a:t>, </a:t>
+            </a:r>
+            <a:r>
+              <a:rPr lang="ko-KR" altLang="en-US" dirty="0"/>
+              <a:t>유제품</a:t>
+            </a:r>
+            <a:r>
+              <a:rPr lang="en-US" altLang="ko-KR" dirty="0"/>
+              <a:t>, </a:t>
+            </a:r>
+            <a:r>
+              <a:rPr lang="ko-KR" altLang="en-US" dirty="0"/>
+              <a:t>곡류</a:t>
+            </a:r>
+            <a:endParaRPr lang="en-US" altLang="ko-KR" dirty="0"/>
+          </a:p>
+          <a:p>
+            <a:r>
+              <a:rPr lang="ko-KR" altLang="en-US" dirty="0"/>
+              <a:t>레시피 조리법은 볶음</a:t>
+            </a:r>
+            <a:r>
+              <a:rPr lang="en-US" altLang="ko-KR" dirty="0"/>
+              <a:t>, </a:t>
+            </a:r>
+            <a:r>
+              <a:rPr lang="ko-KR" altLang="en-US" dirty="0"/>
+              <a:t>끓이기</a:t>
+            </a:r>
+            <a:r>
+              <a:rPr lang="en-US" altLang="ko-KR" dirty="0"/>
+              <a:t>, </a:t>
+            </a:r>
+            <a:r>
+              <a:rPr lang="ko-KR" altLang="en-US" dirty="0"/>
+              <a:t>부침</a:t>
+            </a:r>
+            <a:r>
+              <a:rPr lang="en-US" altLang="ko-KR" dirty="0"/>
+              <a:t>, </a:t>
+            </a:r>
+            <a:r>
+              <a:rPr lang="ko-KR" altLang="en-US" dirty="0"/>
+              <a:t>조림</a:t>
+            </a:r>
+            <a:r>
+              <a:rPr lang="en-US" altLang="ko-KR" dirty="0"/>
+              <a:t>, </a:t>
+            </a:r>
+            <a:r>
+              <a:rPr lang="ko-KR" altLang="en-US" dirty="0"/>
+              <a:t>무침</a:t>
+            </a:r>
+            <a:r>
+              <a:rPr lang="en-US" altLang="ko-KR" dirty="0"/>
+              <a:t>, </a:t>
+            </a:r>
+            <a:r>
+              <a:rPr lang="ko-KR" altLang="en-US" dirty="0"/>
+              <a:t>비빔</a:t>
+            </a:r>
+            <a:r>
+              <a:rPr lang="en-US" altLang="ko-KR" dirty="0"/>
+              <a:t>, </a:t>
+            </a:r>
+            <a:r>
+              <a:rPr lang="ko-KR" altLang="en-US" dirty="0"/>
+              <a:t>찜</a:t>
+            </a:r>
+            <a:r>
+              <a:rPr lang="en-US" altLang="ko-KR" dirty="0"/>
+              <a:t>, </a:t>
+            </a:r>
+            <a:r>
+              <a:rPr lang="ko-KR" altLang="en-US" dirty="0"/>
+              <a:t>절임</a:t>
+            </a:r>
+            <a:r>
+              <a:rPr lang="en-US" altLang="ko-KR" dirty="0"/>
+              <a:t>, </a:t>
+            </a:r>
+            <a:r>
+              <a:rPr lang="ko-KR" altLang="en-US" dirty="0"/>
+              <a:t>튀김</a:t>
+            </a:r>
+            <a:r>
+              <a:rPr lang="en-US" altLang="ko-KR" dirty="0"/>
+              <a:t>, </a:t>
+            </a:r>
+            <a:r>
+              <a:rPr lang="ko-KR" altLang="en-US" dirty="0"/>
+              <a:t>삶기</a:t>
+            </a:r>
+            <a:r>
+              <a:rPr lang="en-US" altLang="ko-KR" dirty="0"/>
+              <a:t>, </a:t>
+            </a:r>
+            <a:r>
+              <a:rPr lang="ko-KR" altLang="en-US" dirty="0"/>
+              <a:t>굽기</a:t>
+            </a:r>
+            <a:r>
+              <a:rPr lang="en-US" altLang="ko-KR" dirty="0"/>
+              <a:t>, </a:t>
+            </a:r>
+            <a:r>
+              <a:rPr lang="ko-KR" altLang="en-US" dirty="0"/>
+              <a:t>데치기</a:t>
+            </a:r>
+            <a:r>
+              <a:rPr lang="en-US" altLang="ko-KR" dirty="0"/>
+              <a:t>, </a:t>
+            </a:r>
+            <a:r>
+              <a:rPr lang="ko-KR" altLang="en-US" dirty="0"/>
+              <a:t>회</a:t>
+            </a:r>
+            <a:r>
+              <a:rPr lang="en-US" altLang="ko-KR" dirty="0"/>
+              <a:t>, </a:t>
+            </a:r>
+            <a:r>
+              <a:rPr lang="ko-KR" altLang="en-US" dirty="0"/>
+              <a:t>기타</a:t>
+            </a:r>
+          </a:p>
+        </p:txBody>
+      </p:sp>
+    </p:spTree>
+    <p:extLst>
+      <p:ext uri="{BB962C8B-B14F-4D97-AF65-F5344CB8AC3E}">
+        <p14:creationId xmlns:p14="http://schemas.microsoft.com/office/powerpoint/2010/main" val="2152951494"/>
+      </p:ext>
+    </p:extLst>
+  </p:cSld>
+  <p:clrMapOvr>
+    <a:masterClrMapping/>
+  </p:clrMapOvr>
+</p:sld>
+</file>
+
+<file path=ppt/slides/slide4.xml><?xml version="1.0" encoding="utf-8"?>
+<p:sld xmlns:a="http://schemas.openxmlformats.org/drawingml/2006/main" xmlns:r="http://schemas.openxmlformats.org/officeDocument/2006/relationships" xmlns:p="http://schemas.openxmlformats.org/presentationml/2006/main">
+  <p:cSld>
+    <p:spTree>
+      <p:nvGrpSpPr>
+        <p:cNvPr id="1" name=""/>
+        <p:cNvGrpSpPr/>
+        <p:nvPr/>
+      </p:nvGrpSpPr>
+      <p:grpSpPr>
+        <a:xfrm>
+          <a:off x="0" y="0"/>
+          <a:ext cx="0" cy="0"/>
+          <a:chOff x="0" y="0"/>
+          <a:chExt cx="0" cy="0"/>
+        </a:xfrm>
+      </p:grpSpPr>
+      <p:sp>
+        <p:nvSpPr>
+          <p:cNvPr id="2" name="제목 1">
+            <a:extLst>
+              <a:ext uri="{FF2B5EF4-FFF2-40B4-BE49-F238E27FC236}">
+                <a16:creationId xmlns:a16="http://schemas.microsoft.com/office/drawing/2014/main" id="{064EFA5B-CAAE-45F8-A9CB-E7768D075E5D}"/>
+              </a:ext>
+            </a:extLst>
+          </p:cNvPr>
+          <p:cNvSpPr>
+            <a:spLocks noGrp="1"/>
+          </p:cNvSpPr>
+          <p:nvPr>
+            <p:ph type="title"/>
+          </p:nvPr>
+        </p:nvSpPr>
+        <p:spPr/>
+        <p:txBody>
+          <a:bodyPr/>
+          <a:lstStyle/>
+          <a:p>
+            <a:r>
+              <a:rPr lang="ko-KR" altLang="en-US" dirty="0"/>
+              <a:t>선호도 점수</a:t>
+            </a:r>
+          </a:p>
+        </p:txBody>
+      </p:sp>
+      <p:sp>
+        <p:nvSpPr>
+          <p:cNvPr id="3" name="내용 개체 틀 2">
+            <a:extLst>
+              <a:ext uri="{FF2B5EF4-FFF2-40B4-BE49-F238E27FC236}">
+                <a16:creationId xmlns:a16="http://schemas.microsoft.com/office/drawing/2014/main" id="{0018E76E-D1D8-44D7-8B5E-58E4FDD686E4}"/>
+              </a:ext>
+            </a:extLst>
+          </p:cNvPr>
+          <p:cNvSpPr>
+            <a:spLocks noGrp="1"/>
+          </p:cNvSpPr>
+          <p:nvPr>
+            <p:ph idx="1"/>
+          </p:nvPr>
+        </p:nvSpPr>
+        <p:spPr/>
+        <p:txBody>
+          <a:bodyPr/>
+          <a:lstStyle/>
+          <a:p>
+            <a:r>
+              <a:rPr lang="en-US" altLang="ko-KR" dirty="0"/>
+              <a:t>0~5, -1 </a:t>
+            </a:r>
+            <a:r>
+              <a:rPr lang="ko-KR" altLang="en-US" dirty="0"/>
+              <a:t>이면 추천에서 제외</a:t>
+            </a:r>
+            <a:endParaRPr lang="en-US" altLang="ko-KR" dirty="0"/>
+          </a:p>
+          <a:p>
+            <a:r>
+              <a:rPr lang="ko-KR" altLang="en-US" dirty="0"/>
+              <a:t>모든 식품 기본 </a:t>
+            </a:r>
+            <a:r>
+              <a:rPr lang="en-US" altLang="ko-KR" dirty="0"/>
+              <a:t>1</a:t>
+            </a:r>
+            <a:r>
+              <a:rPr lang="ko-KR" altLang="en-US" dirty="0"/>
+              <a:t>점</a:t>
+            </a:r>
+            <a:endParaRPr lang="en-US" altLang="ko-KR" dirty="0"/>
+          </a:p>
+          <a:p>
+            <a:r>
+              <a:rPr lang="ko-KR" altLang="en-US" dirty="0"/>
+              <a:t>처음 설문조사에서 조리법</a:t>
+            </a:r>
+            <a:r>
+              <a:rPr lang="en-US" altLang="ko-KR" dirty="0"/>
+              <a:t>, </a:t>
+            </a:r>
+            <a:r>
+              <a:rPr lang="ko-KR" altLang="en-US" dirty="0"/>
+              <a:t>종류 선호도 조사 후 선호하는 건 </a:t>
+            </a:r>
+            <a:r>
+              <a:rPr lang="en-US" altLang="ko-KR" dirty="0"/>
+              <a:t>+1</a:t>
+            </a:r>
+            <a:r>
+              <a:rPr lang="ko-KR" altLang="en-US" dirty="0"/>
+              <a:t>점 씩</a:t>
+            </a:r>
+            <a:r>
+              <a:rPr lang="en-US" altLang="ko-KR" dirty="0"/>
+              <a:t>, </a:t>
+            </a:r>
+            <a:r>
+              <a:rPr lang="ko-KR" altLang="en-US" dirty="0"/>
+              <a:t>싫어하는 건 </a:t>
+            </a:r>
+            <a:r>
+              <a:rPr lang="en-US" altLang="ko-KR" dirty="0"/>
+              <a:t>-1</a:t>
+            </a:r>
+            <a:r>
+              <a:rPr lang="ko-KR" altLang="en-US" dirty="0"/>
+              <a:t>점 씩</a:t>
+            </a:r>
+            <a:r>
+              <a:rPr lang="en-US" altLang="ko-KR" dirty="0"/>
+              <a:t>(</a:t>
+            </a:r>
+            <a:r>
+              <a:rPr lang="ko-KR" altLang="en-US" dirty="0"/>
+              <a:t>최소 </a:t>
+            </a:r>
+            <a:r>
+              <a:rPr lang="en-US" altLang="ko-KR" dirty="0"/>
+              <a:t>0</a:t>
+            </a:r>
+            <a:r>
+              <a:rPr lang="ko-KR" altLang="en-US" dirty="0"/>
+              <a:t>점</a:t>
+            </a:r>
+            <a:r>
+              <a:rPr lang="en-US" altLang="ko-KR" dirty="0"/>
+              <a:t>, </a:t>
+            </a:r>
+            <a:r>
+              <a:rPr lang="ko-KR" altLang="en-US" dirty="0"/>
+              <a:t>제외로 설정시만 </a:t>
+            </a:r>
+            <a:r>
+              <a:rPr lang="en-US" altLang="ko-KR" dirty="0"/>
+              <a:t>-1</a:t>
+            </a:r>
+            <a:r>
+              <a:rPr lang="ko-KR" altLang="en-US" dirty="0"/>
+              <a:t>점</a:t>
+            </a:r>
+            <a:r>
+              <a:rPr lang="en-US" altLang="ko-KR" dirty="0"/>
+              <a:t>)</a:t>
+            </a:r>
+          </a:p>
+          <a:p>
+            <a:r>
+              <a:rPr lang="ko-KR" altLang="en-US" dirty="0"/>
+              <a:t>추천은 한 번에 </a:t>
+            </a:r>
+            <a:r>
+              <a:rPr lang="en-US" altLang="ko-KR" dirty="0"/>
+              <a:t>3~5</a:t>
+            </a:r>
+            <a:r>
+              <a:rPr lang="ko-KR" altLang="en-US" dirty="0"/>
+              <a:t>개 정도</a:t>
+            </a:r>
+            <a:endParaRPr lang="en-US" altLang="ko-KR" dirty="0"/>
+          </a:p>
+          <a:p>
+            <a:r>
+              <a:rPr lang="ko-KR" altLang="en-US" dirty="0"/>
+              <a:t>추천 후 좋아요 싫어요 설문조사 후 추천한 레시피 전부 </a:t>
+            </a:r>
+            <a:r>
+              <a:rPr lang="en-US" altLang="ko-KR" dirty="0"/>
+              <a:t>+1 </a:t>
+            </a:r>
+            <a:r>
+              <a:rPr lang="ko-KR" altLang="en-US" dirty="0"/>
+              <a:t>혹은 </a:t>
+            </a:r>
+            <a:r>
+              <a:rPr lang="en-US" altLang="ko-KR" dirty="0"/>
+              <a:t>-1</a:t>
+            </a:r>
+            <a:r>
+              <a:rPr lang="ko-KR" altLang="en-US" dirty="0"/>
+              <a:t>점</a:t>
+            </a:r>
+            <a:r>
+              <a:rPr lang="en-US" altLang="ko-KR" dirty="0"/>
+              <a:t>, </a:t>
+            </a:r>
+            <a:r>
+              <a:rPr lang="ko-KR" altLang="en-US" dirty="0"/>
+              <a:t>보통 선택하거나 그냥 닫으면 점수 변동 없음</a:t>
+            </a:r>
+            <a:endParaRPr lang="en-US" altLang="ko-KR" dirty="0"/>
+          </a:p>
+          <a:p>
+            <a:endParaRPr lang="ko-KR" altLang="en-US" dirty="0"/>
+          </a:p>
+        </p:txBody>
+      </p:sp>
+    </p:spTree>
+    <p:extLst>
+      <p:ext uri="{BB962C8B-B14F-4D97-AF65-F5344CB8AC3E}">
+        <p14:creationId xmlns:p14="http://schemas.microsoft.com/office/powerpoint/2010/main" val="1159618764"/>
       </p:ext>
     </p:extLst>
   </p:cSld>

</xml_diff>